<commit_message>
alterações na entrega de acordo com a monitoria
</commit_message>
<xml_diff>
--- a/labs/2021/01-data-flow/solucoes/Lab01 - Diagramas de Referência.pptx
+++ b/labs/2021/01-data-flow/solucoes/Lab01 - Diagramas de Referência.pptx
@@ -5,13 +5,14 @@
     <p:sldMasterId id="2147483660" r:id="rId1"/>
   </p:sldMasterIdLst>
   <p:notesMasterIdLst>
-    <p:notesMasterId r:id="rId6"/>
+    <p:notesMasterId r:id="rId7"/>
   </p:notesMasterIdLst>
   <p:sldIdLst>
     <p:sldId id="256" r:id="rId2"/>
     <p:sldId id="257" r:id="rId3"/>
-    <p:sldId id="258" r:id="rId4"/>
-    <p:sldId id="259" r:id="rId5"/>
+    <p:sldId id="260" r:id="rId4"/>
+    <p:sldId id="258" r:id="rId5"/>
+    <p:sldId id="259" r:id="rId6"/>
   </p:sldIdLst>
   <p:sldSz cx="9144000" cy="5143500" type="screen16x9"/>
   <p:notesSz cx="6858000" cy="9144000"/>
@@ -1045,7 +1046,7 @@
         </p:nvSpPr>
         <p:spPr>
           <a:xfrm>
-            <a:off x="381300" y="685800"/>
+            <a:off x="381000" y="685800"/>
             <a:ext cx="6096000" cy="3429000"/>
           </a:xfrm>
           <a:custGeom>
@@ -6260,8 +6261,8 @@
         </p:nvSpPr>
         <p:spPr>
           <a:xfrm>
-            <a:off x="3511310" y="191586"/>
-            <a:ext cx="1713900" cy="2089800"/>
+            <a:off x="4032824" y="191586"/>
+            <a:ext cx="1192385" cy="1417509"/>
           </a:xfrm>
           <a:prstGeom prst="rect">
             <a:avLst/>
@@ -6444,7 +6445,7 @@
                 <a:cs typeface="Verdana"/>
                 <a:sym typeface="Verdana"/>
               </a:rPr>
-              <a:t>Escolha Refeição</a:t>
+              <a:t>Pedido</a:t>
             </a:r>
             <a:endParaRPr sz="1200" b="0" i="0" u="none" strike="noStrike" cap="none" dirty="0">
               <a:latin typeface="Arial"/>
@@ -6752,7 +6753,7 @@
         </p:nvSpPr>
         <p:spPr>
           <a:xfrm>
-            <a:off x="1499755" y="374879"/>
+            <a:off x="1536225" y="299280"/>
             <a:ext cx="1562400" cy="216000"/>
           </a:xfrm>
           <a:prstGeom prst="rect">
@@ -6785,7 +6786,7 @@
                 <a:cs typeface="Verdana"/>
                 <a:sym typeface="Verdana"/>
               </a:rPr>
-              <a:t>Verifica pedidos cliente</a:t>
+              <a:t>Verificar histórico pedidos cliente</a:t>
             </a:r>
             <a:endParaRPr sz="900" b="0" strike="noStrike" dirty="0">
               <a:latin typeface="Arial"/>
@@ -6984,7 +6985,7 @@
                 <a:cs typeface="Verdana"/>
                 <a:sym typeface="Verdana"/>
               </a:rPr>
-              <a:t>Efetiva Pedido</a:t>
+              <a:t>Efetivar Pedido</a:t>
             </a:r>
             <a:endParaRPr sz="900" b="0" strike="noStrike" dirty="0">
               <a:latin typeface="Arial"/>
@@ -6995,93 +6996,6 @@
           </a:p>
         </p:txBody>
       </p:sp>
-      <p:grpSp>
-        <p:nvGrpSpPr>
-          <p:cNvPr id="78" name="Google Shape;78;p15"/>
-          <p:cNvGrpSpPr/>
-          <p:nvPr/>
-        </p:nvGrpSpPr>
-        <p:grpSpPr>
-          <a:xfrm>
-            <a:off x="7205210" y="3385369"/>
-            <a:ext cx="220970" cy="401664"/>
-            <a:chOff x="8158320" y="4445640"/>
-            <a:chExt cx="243600" cy="442800"/>
-          </a:xfrm>
-        </p:grpSpPr>
-        <p:sp>
-          <p:nvSpPr>
-            <p:cNvPr id="79" name="Google Shape;79;p15"/>
-            <p:cNvSpPr/>
-            <p:nvPr/>
-          </p:nvSpPr>
-          <p:spPr>
-            <a:xfrm rot="-5400000">
-              <a:off x="8158620" y="4445340"/>
-              <a:ext cx="243000" cy="243600"/>
-            </a:xfrm>
-            <a:prstGeom prst="ellipse">
-              <a:avLst/>
-            </a:prstGeom>
-            <a:solidFill>
-              <a:srgbClr val="FFFFFF"/>
-            </a:solidFill>
-            <a:ln w="29150" cap="flat" cmpd="sng">
-              <a:solidFill>
-                <a:srgbClr val="000000"/>
-              </a:solidFill>
-              <a:prstDash val="solid"/>
-              <a:round/>
-              <a:headEnd type="none" w="sm" len="sm"/>
-              <a:tailEnd type="none" w="sm" len="sm"/>
-            </a:ln>
-          </p:spPr>
-          <p:txBody>
-            <a:bodyPr spcFirstLastPara="1" wrap="square" lIns="82925" tIns="82925" rIns="82925" bIns="82925" anchor="ctr" anchorCtr="0">
-              <a:noAutofit/>
-            </a:bodyPr>
-            <a:lstStyle/>
-            <a:p>
-              <a:pPr marL="0" lvl="0" indent="0" algn="l" rtl="0">
-                <a:spcBef>
-                  <a:spcPts val="0"/>
-                </a:spcBef>
-                <a:spcAft>
-                  <a:spcPts val="0"/>
-                </a:spcAft>
-                <a:buNone/>
-              </a:pPr>
-              <a:endParaRPr/>
-            </a:p>
-          </p:txBody>
-        </p:sp>
-        <p:cxnSp>
-          <p:nvCxnSpPr>
-            <p:cNvPr id="80" name="Google Shape;80;p15"/>
-            <p:cNvCxnSpPr/>
-            <p:nvPr/>
-          </p:nvCxnSpPr>
-          <p:spPr>
-            <a:xfrm rot="10800000">
-              <a:off x="8280000" y="4688640"/>
-              <a:ext cx="0" cy="199800"/>
-            </a:xfrm>
-            <a:prstGeom prst="straightConnector1">
-              <a:avLst/>
-            </a:prstGeom>
-            <a:noFill/>
-            <a:ln w="29150" cap="flat" cmpd="sng">
-              <a:solidFill>
-                <a:srgbClr val="000000"/>
-              </a:solidFill>
-              <a:prstDash val="solid"/>
-              <a:round/>
-              <a:headEnd type="none" w="sm" len="sm"/>
-              <a:tailEnd type="none" w="sm" len="sm"/>
-            </a:ln>
-          </p:spPr>
-        </p:cxnSp>
-      </p:grpSp>
       <p:sp>
         <p:nvSpPr>
           <p:cNvPr id="81" name="Google Shape;81;p15"/>
@@ -7196,7 +7110,7 @@
         </p:nvSpPr>
         <p:spPr>
           <a:xfrm>
-            <a:off x="6576972" y="2046005"/>
+            <a:off x="6572826" y="1008668"/>
             <a:ext cx="1771500" cy="725100"/>
           </a:xfrm>
           <a:prstGeom prst="rect">
@@ -7294,34 +7208,6 @@
           </a:p>
         </p:txBody>
       </p:sp>
-      <p:cxnSp>
-        <p:nvCxnSpPr>
-          <p:cNvPr id="89" name="Google Shape;89;p15"/>
-          <p:cNvCxnSpPr>
-            <a:cxnSpLocks/>
-          </p:cNvCxnSpPr>
-          <p:nvPr/>
-        </p:nvCxnSpPr>
-        <p:spPr>
-          <a:xfrm>
-            <a:off x="7331958" y="3087667"/>
-            <a:ext cx="20170" cy="486651"/>
-          </a:xfrm>
-          <a:prstGeom prst="straightConnector1">
-            <a:avLst/>
-          </a:prstGeom>
-          <a:noFill/>
-          <a:ln w="29150" cap="flat" cmpd="sng">
-            <a:solidFill>
-              <a:srgbClr val="000000"/>
-            </a:solidFill>
-            <a:prstDash val="dashDot"/>
-            <a:round/>
-            <a:headEnd type="none" w="sm" len="sm"/>
-            <a:tailEnd type="triangle" w="med" len="med"/>
-          </a:ln>
-        </p:spPr>
-      </p:cxnSp>
       <p:sp>
         <p:nvSpPr>
           <p:cNvPr id="90" name="Google Shape;90;p15"/>
@@ -7330,7 +7216,7 @@
         </p:nvSpPr>
         <p:spPr>
           <a:xfrm>
-            <a:off x="6091377" y="2780065"/>
+            <a:off x="5736480" y="874663"/>
             <a:ext cx="853395" cy="467419"/>
           </a:xfrm>
           <a:prstGeom prst="rect">
@@ -7349,13 +7235,12 @@
           <a:p>
             <a:pPr lvl="0" algn="ctr"/>
             <a:r>
-              <a:rPr lang="pt-BR" sz="900" dirty="0">
+              <a:rPr lang="pt-BR" sz="900" b="0" strike="noStrike" dirty="0">
                 <a:latin typeface="Verdana"/>
                 <a:ea typeface="Verdana"/>
-                <a:cs typeface="Verdana"/>
                 <a:sym typeface="Verdana"/>
               </a:rPr>
-              <a:t>Solicita Preparo Pedido</a:t>
+              <a:t>Preparar Pedido</a:t>
             </a:r>
             <a:endParaRPr sz="900" b="0" strike="noStrike" dirty="0">
               <a:latin typeface="Arial"/>
@@ -7814,228 +7699,6 @@
       </p:grpSp>
       <p:grpSp>
         <p:nvGrpSpPr>
-          <p:cNvPr id="96" name="Google Shape;96;p15"/>
-          <p:cNvGrpSpPr/>
-          <p:nvPr/>
-        </p:nvGrpSpPr>
-        <p:grpSpPr>
-          <a:xfrm>
-            <a:off x="1795965" y="2310973"/>
-            <a:ext cx="344190" cy="225324"/>
-            <a:chOff x="2176920" y="3200400"/>
-            <a:chExt cx="379440" cy="248400"/>
-          </a:xfrm>
-        </p:grpSpPr>
-        <p:sp>
-          <p:nvSpPr>
-            <p:cNvPr id="97" name="Google Shape;97;p15"/>
-            <p:cNvSpPr/>
-            <p:nvPr/>
-          </p:nvSpPr>
-          <p:spPr>
-            <a:xfrm>
-              <a:off x="2428920" y="3200400"/>
-              <a:ext cx="127440" cy="248400"/>
-            </a:xfrm>
-            <a:custGeom>
-              <a:avLst/>
-              <a:gdLst/>
-              <a:ahLst/>
-              <a:cxnLst/>
-              <a:rect l="l" t="t" r="r" b="b"/>
-              <a:pathLst>
-                <a:path w="354" h="690" extrusionOk="0">
-                  <a:moveTo>
-                    <a:pt x="352" y="0"/>
-                  </a:moveTo>
-                  <a:cubicBezTo>
-                    <a:pt x="351" y="0"/>
-                    <a:pt x="351" y="0"/>
-                    <a:pt x="350" y="1"/>
-                  </a:cubicBezTo>
-                  <a:cubicBezTo>
-                    <a:pt x="350" y="1"/>
-                    <a:pt x="349" y="1"/>
-                    <a:pt x="349" y="2"/>
-                  </a:cubicBezTo>
-                  <a:cubicBezTo>
-                    <a:pt x="348" y="3"/>
-                    <a:pt x="348" y="3"/>
-                    <a:pt x="348" y="4"/>
-                  </a:cubicBezTo>
-                  <a:lnTo>
-                    <a:pt x="348" y="8"/>
-                  </a:lnTo>
-                  <a:cubicBezTo>
-                    <a:pt x="347" y="8"/>
-                    <a:pt x="346" y="8"/>
-                    <a:pt x="345" y="8"/>
-                  </a:cubicBezTo>
-                  <a:cubicBezTo>
-                    <a:pt x="298" y="8"/>
-                    <a:pt x="252" y="17"/>
-                    <a:pt x="211" y="33"/>
-                  </a:cubicBezTo>
-                  <a:cubicBezTo>
-                    <a:pt x="171" y="50"/>
-                    <a:pt x="135" y="75"/>
-                    <a:pt x="104" y="104"/>
-                  </a:cubicBezTo>
-                  <a:cubicBezTo>
-                    <a:pt x="75" y="135"/>
-                    <a:pt x="50" y="171"/>
-                    <a:pt x="33" y="211"/>
-                  </a:cubicBezTo>
-                  <a:cubicBezTo>
-                    <a:pt x="17" y="252"/>
-                    <a:pt x="8" y="298"/>
-                    <a:pt x="8" y="345"/>
-                  </a:cubicBezTo>
-                  <a:cubicBezTo>
-                    <a:pt x="8" y="392"/>
-                    <a:pt x="17" y="437"/>
-                    <a:pt x="33" y="478"/>
-                  </a:cubicBezTo>
-                  <a:cubicBezTo>
-                    <a:pt x="50" y="519"/>
-                    <a:pt x="75" y="555"/>
-                    <a:pt x="104" y="585"/>
-                  </a:cubicBezTo>
-                  <a:cubicBezTo>
-                    <a:pt x="135" y="615"/>
-                    <a:pt x="171" y="640"/>
-                    <a:pt x="211" y="656"/>
-                  </a:cubicBezTo>
-                  <a:cubicBezTo>
-                    <a:pt x="252" y="673"/>
-                    <a:pt x="298" y="683"/>
-                    <a:pt x="345" y="683"/>
-                  </a:cubicBezTo>
-                  <a:cubicBezTo>
-                    <a:pt x="346" y="683"/>
-                    <a:pt x="347" y="683"/>
-                    <a:pt x="348" y="683"/>
-                  </a:cubicBezTo>
-                  <a:lnTo>
-                    <a:pt x="348" y="689"/>
-                  </a:lnTo>
-                  <a:cubicBezTo>
-                    <a:pt x="347" y="689"/>
-                    <a:pt x="346" y="689"/>
-                    <a:pt x="345" y="689"/>
-                  </a:cubicBezTo>
-                  <a:cubicBezTo>
-                    <a:pt x="296" y="689"/>
-                    <a:pt x="250" y="680"/>
-                    <a:pt x="208" y="663"/>
-                  </a:cubicBezTo>
-                  <a:cubicBezTo>
-                    <a:pt x="167" y="646"/>
-                    <a:pt x="130" y="621"/>
-                    <a:pt x="99" y="590"/>
-                  </a:cubicBezTo>
-                  <a:cubicBezTo>
-                    <a:pt x="68" y="559"/>
-                    <a:pt x="43" y="522"/>
-                    <a:pt x="27" y="481"/>
-                  </a:cubicBezTo>
-                  <a:cubicBezTo>
-                    <a:pt x="10" y="439"/>
-                    <a:pt x="0" y="393"/>
-                    <a:pt x="0" y="345"/>
-                  </a:cubicBezTo>
-                  <a:cubicBezTo>
-                    <a:pt x="0" y="296"/>
-                    <a:pt x="10" y="250"/>
-                    <a:pt x="27" y="208"/>
-                  </a:cubicBezTo>
-                  <a:cubicBezTo>
-                    <a:pt x="43" y="167"/>
-                    <a:pt x="68" y="130"/>
-                    <a:pt x="99" y="99"/>
-                  </a:cubicBezTo>
-                  <a:cubicBezTo>
-                    <a:pt x="130" y="68"/>
-                    <a:pt x="167" y="43"/>
-                    <a:pt x="208" y="27"/>
-                  </a:cubicBezTo>
-                  <a:cubicBezTo>
-                    <a:pt x="250" y="10"/>
-                    <a:pt x="296" y="0"/>
-                    <a:pt x="345" y="0"/>
-                  </a:cubicBezTo>
-                  <a:cubicBezTo>
-                    <a:pt x="347" y="0"/>
-                    <a:pt x="350" y="0"/>
-                    <a:pt x="353" y="0"/>
-                  </a:cubicBezTo>
-                  <a:lnTo>
-                    <a:pt x="352" y="0"/>
-                  </a:lnTo>
-                </a:path>
-              </a:pathLst>
-            </a:custGeom>
-            <a:solidFill>
-              <a:srgbClr val="000000"/>
-            </a:solidFill>
-            <a:ln w="29150" cap="flat" cmpd="sng">
-              <a:solidFill>
-                <a:srgbClr val="000000"/>
-              </a:solidFill>
-              <a:prstDash val="solid"/>
-              <a:round/>
-              <a:headEnd type="none" w="sm" len="sm"/>
-              <a:tailEnd type="none" w="sm" len="sm"/>
-            </a:ln>
-          </p:spPr>
-          <p:txBody>
-            <a:bodyPr spcFirstLastPara="1" wrap="square" lIns="82925" tIns="82925" rIns="82925" bIns="82925" anchor="ctr" anchorCtr="0">
-              <a:noAutofit/>
-            </a:bodyPr>
-            <a:lstStyle/>
-            <a:p>
-              <a:pPr marL="0" lvl="0" indent="0" algn="l" rtl="0">
-                <a:spcBef>
-                  <a:spcPts val="0"/>
-                </a:spcBef>
-                <a:spcAft>
-                  <a:spcPts val="0"/>
-                </a:spcAft>
-                <a:buNone/>
-              </a:pPr>
-              <a:endParaRPr/>
-            </a:p>
-          </p:txBody>
-        </p:sp>
-        <p:cxnSp>
-          <p:nvCxnSpPr>
-            <p:cNvPr id="98" name="Google Shape;98;p15"/>
-            <p:cNvCxnSpPr/>
-            <p:nvPr/>
-          </p:nvCxnSpPr>
-          <p:spPr>
-            <a:xfrm>
-              <a:off x="2176920" y="3324240"/>
-              <a:ext cx="252000" cy="0"/>
-            </a:xfrm>
-            <a:prstGeom prst="straightConnector1">
-              <a:avLst/>
-            </a:prstGeom>
-            <a:noFill/>
-            <a:ln w="29150" cap="flat" cmpd="sng">
-              <a:solidFill>
-                <a:srgbClr val="000000"/>
-              </a:solidFill>
-              <a:prstDash val="solid"/>
-              <a:round/>
-              <a:headEnd type="none" w="sm" len="sm"/>
-              <a:tailEnd type="none" w="sm" len="sm"/>
-            </a:ln>
-          </p:spPr>
-        </p:cxnSp>
-      </p:grpSp>
-      <p:grpSp>
-        <p:nvGrpSpPr>
           <p:cNvPr id="102" name="Google Shape;102;p15"/>
           <p:cNvGrpSpPr/>
           <p:nvPr/>
@@ -8258,100 +7921,13 @@
       </p:grpSp>
       <p:grpSp>
         <p:nvGrpSpPr>
-          <p:cNvPr id="105" name="Google Shape;105;p15"/>
-          <p:cNvGrpSpPr/>
-          <p:nvPr/>
-        </p:nvGrpSpPr>
-        <p:grpSpPr>
-          <a:xfrm>
-            <a:off x="6132039" y="2215607"/>
-            <a:ext cx="449015" cy="129923"/>
-            <a:chOff x="6952680" y="2924280"/>
-            <a:chExt cx="495000" cy="243600"/>
-          </a:xfrm>
-        </p:grpSpPr>
-        <p:sp>
-          <p:nvSpPr>
-            <p:cNvPr id="106" name="Google Shape;106;p15"/>
-            <p:cNvSpPr/>
-            <p:nvPr/>
-          </p:nvSpPr>
-          <p:spPr>
-            <a:xfrm>
-              <a:off x="6952680" y="2924280"/>
-              <a:ext cx="243000" cy="243600"/>
-            </a:xfrm>
-            <a:prstGeom prst="ellipse">
-              <a:avLst/>
-            </a:prstGeom>
-            <a:solidFill>
-              <a:srgbClr val="FFFFFF"/>
-            </a:solidFill>
-            <a:ln w="29150" cap="flat" cmpd="sng">
-              <a:solidFill>
-                <a:srgbClr val="000000"/>
-              </a:solidFill>
-              <a:prstDash val="solid"/>
-              <a:round/>
-              <a:headEnd type="none" w="sm" len="sm"/>
-              <a:tailEnd type="none" w="sm" len="sm"/>
-            </a:ln>
-          </p:spPr>
-          <p:txBody>
-            <a:bodyPr spcFirstLastPara="1" wrap="square" lIns="82925" tIns="82925" rIns="82925" bIns="82925" anchor="ctr" anchorCtr="0">
-              <a:noAutofit/>
-            </a:bodyPr>
-            <a:lstStyle/>
-            <a:p>
-              <a:pPr marL="0" lvl="0" indent="0" algn="l" rtl="0">
-                <a:spcBef>
-                  <a:spcPts val="0"/>
-                </a:spcBef>
-                <a:spcAft>
-                  <a:spcPts val="0"/>
-                </a:spcAft>
-                <a:buNone/>
-              </a:pPr>
-              <a:endParaRPr dirty="0"/>
-            </a:p>
-          </p:txBody>
-        </p:sp>
-        <p:cxnSp>
-          <p:nvCxnSpPr>
-            <p:cNvPr id="107" name="Google Shape;107;p15"/>
-            <p:cNvCxnSpPr/>
-            <p:nvPr/>
-          </p:nvCxnSpPr>
-          <p:spPr>
-            <a:xfrm>
-              <a:off x="7195680" y="3045960"/>
-              <a:ext cx="252000" cy="0"/>
-            </a:xfrm>
-            <a:prstGeom prst="straightConnector1">
-              <a:avLst/>
-            </a:prstGeom>
-            <a:noFill/>
-            <a:ln w="29150" cap="flat" cmpd="sng">
-              <a:solidFill>
-                <a:srgbClr val="000000"/>
-              </a:solidFill>
-              <a:prstDash val="solid"/>
-              <a:round/>
-              <a:headEnd type="none" w="sm" len="sm"/>
-              <a:tailEnd type="none" w="sm" len="sm"/>
-            </a:ln>
-          </p:spPr>
-        </p:cxnSp>
-      </p:grpSp>
-      <p:grpSp>
-        <p:nvGrpSpPr>
           <p:cNvPr id="111" name="Google Shape;111;p15"/>
           <p:cNvGrpSpPr/>
           <p:nvPr/>
         </p:nvGrpSpPr>
         <p:grpSpPr>
           <a:xfrm>
-            <a:off x="6123812" y="2485028"/>
+            <a:off x="6140861" y="1301228"/>
             <a:ext cx="449014" cy="220970"/>
             <a:chOff x="6948000" y="3392280"/>
             <a:chExt cx="495000" cy="243600"/>
@@ -8525,8 +8101,8 @@
         </p:nvSpPr>
         <p:spPr>
           <a:xfrm>
-            <a:off x="2890862" y="1236513"/>
-            <a:ext cx="653100" cy="350400"/>
+            <a:off x="2806995" y="1236513"/>
+            <a:ext cx="736967" cy="350400"/>
           </a:xfrm>
           <a:prstGeom prst="rect">
             <a:avLst/>
@@ -8558,7 +8134,7 @@
                 <a:cs typeface="Verdana"/>
                 <a:sym typeface="Verdana"/>
               </a:rPr>
-              <a:t>Verifica todos os pedidos</a:t>
+              <a:t>Verificar histórico pedidos</a:t>
             </a:r>
             <a:endParaRPr sz="900" b="0" strike="noStrike" dirty="0">
               <a:latin typeface="Arial"/>
@@ -8655,7 +8231,7 @@
         </p:nvSpPr>
         <p:spPr>
           <a:xfrm>
-            <a:off x="8348508" y="4368517"/>
+            <a:off x="8360622" y="4543250"/>
             <a:ext cx="914400" cy="350400"/>
           </a:xfrm>
           <a:prstGeom prst="rect">
@@ -8699,226 +8275,6 @@
           </a:p>
         </p:txBody>
       </p:sp>
-      <p:sp>
-        <p:nvSpPr>
-          <p:cNvPr id="130" name="Google Shape;130;p15"/>
-          <p:cNvSpPr/>
-          <p:nvPr/>
-        </p:nvSpPr>
-        <p:spPr>
-          <a:xfrm>
-            <a:off x="2139795" y="2281440"/>
-            <a:ext cx="3951582" cy="326867"/>
-          </a:xfrm>
-          <a:custGeom>
-            <a:avLst/>
-            <a:gdLst/>
-            <a:ahLst/>
-            <a:cxnLst/>
-            <a:rect l="l" t="t" r="r" b="b"/>
-            <a:pathLst>
-              <a:path w="12101" h="1001" extrusionOk="0">
-                <a:moveTo>
-                  <a:pt x="0" y="400"/>
-                </a:moveTo>
-                <a:lnTo>
-                  <a:pt x="1300" y="400"/>
-                </a:lnTo>
-                <a:cubicBezTo>
-                  <a:pt x="1300" y="400"/>
-                  <a:pt x="1511" y="0"/>
-                  <a:pt x="1700" y="0"/>
-                </a:cubicBezTo>
-                <a:cubicBezTo>
-                  <a:pt x="1889" y="0"/>
-                  <a:pt x="2100" y="400"/>
-                  <a:pt x="2100" y="400"/>
-                </a:cubicBezTo>
-                <a:lnTo>
-                  <a:pt x="6700" y="400"/>
-                </a:lnTo>
-                <a:lnTo>
-                  <a:pt x="6700" y="1000"/>
-                </a:lnTo>
-                <a:lnTo>
-                  <a:pt x="10500" y="1000"/>
-                </a:lnTo>
-                <a:cubicBezTo>
-                  <a:pt x="10500" y="1000"/>
-                  <a:pt x="10711" y="600"/>
-                  <a:pt x="10900" y="600"/>
-                </a:cubicBezTo>
-                <a:cubicBezTo>
-                  <a:pt x="11089" y="600"/>
-                  <a:pt x="11300" y="1000"/>
-                  <a:pt x="11300" y="1000"/>
-                </a:cubicBezTo>
-                <a:lnTo>
-                  <a:pt x="12100" y="1000"/>
-                </a:lnTo>
-              </a:path>
-            </a:pathLst>
-          </a:custGeom>
-          <a:noFill/>
-          <a:ln w="29150" cap="flat" cmpd="sng">
-            <a:solidFill>
-              <a:srgbClr val="000000"/>
-            </a:solidFill>
-            <a:prstDash val="dash"/>
-            <a:round/>
-            <a:headEnd type="none" w="sm" len="sm"/>
-            <a:tailEnd type="none" w="sm" len="sm"/>
-          </a:ln>
-        </p:spPr>
-        <p:txBody>
-          <a:bodyPr spcFirstLastPara="1" wrap="square" lIns="82925" tIns="82925" rIns="82925" bIns="82925" anchor="ctr" anchorCtr="0">
-            <a:noAutofit/>
-          </a:bodyPr>
-          <a:lstStyle/>
-          <a:p>
-            <a:pPr marL="0" lvl="0" indent="0" algn="l" rtl="0">
-              <a:spcBef>
-                <a:spcPts val="0"/>
-              </a:spcBef>
-              <a:spcAft>
-                <a:spcPts val="0"/>
-              </a:spcAft>
-              <a:buNone/>
-            </a:pPr>
-            <a:endParaRPr/>
-          </a:p>
-        </p:txBody>
-      </p:sp>
-      <p:grpSp>
-        <p:nvGrpSpPr>
-          <p:cNvPr id="131" name="Google Shape;131;p15"/>
-          <p:cNvGrpSpPr/>
-          <p:nvPr/>
-        </p:nvGrpSpPr>
-        <p:grpSpPr>
-          <a:xfrm>
-            <a:off x="5169615" y="4273575"/>
-            <a:ext cx="447382" cy="220970"/>
-            <a:chOff x="5896080" y="5364000"/>
-            <a:chExt cx="493200" cy="243600"/>
-          </a:xfrm>
-        </p:grpSpPr>
-        <p:sp>
-          <p:nvSpPr>
-            <p:cNvPr id="132" name="Google Shape;132;p15"/>
-            <p:cNvSpPr/>
-            <p:nvPr/>
-          </p:nvSpPr>
-          <p:spPr>
-            <a:xfrm flipH="1">
-              <a:off x="6146280" y="5364000"/>
-              <a:ext cx="243000" cy="243600"/>
-            </a:xfrm>
-            <a:prstGeom prst="ellipse">
-              <a:avLst/>
-            </a:prstGeom>
-            <a:solidFill>
-              <a:srgbClr val="FFFFFF"/>
-            </a:solidFill>
-            <a:ln w="29150" cap="flat" cmpd="sng">
-              <a:solidFill>
-                <a:srgbClr val="000000"/>
-              </a:solidFill>
-              <a:prstDash val="solid"/>
-              <a:round/>
-              <a:headEnd type="none" w="sm" len="sm"/>
-              <a:tailEnd type="none" w="sm" len="sm"/>
-            </a:ln>
-          </p:spPr>
-          <p:txBody>
-            <a:bodyPr spcFirstLastPara="1" wrap="square" lIns="82925" tIns="82925" rIns="82925" bIns="82925" anchor="ctr" anchorCtr="0">
-              <a:noAutofit/>
-            </a:bodyPr>
-            <a:lstStyle/>
-            <a:p>
-              <a:pPr marL="0" lvl="0" indent="0" algn="l" rtl="0">
-                <a:spcBef>
-                  <a:spcPts val="0"/>
-                </a:spcBef>
-                <a:spcAft>
-                  <a:spcPts val="0"/>
-                </a:spcAft>
-                <a:buNone/>
-              </a:pPr>
-              <a:endParaRPr/>
-            </a:p>
-          </p:txBody>
-        </p:sp>
-        <p:cxnSp>
-          <p:nvCxnSpPr>
-            <p:cNvPr id="133" name="Google Shape;133;p15"/>
-            <p:cNvCxnSpPr/>
-            <p:nvPr/>
-          </p:nvCxnSpPr>
-          <p:spPr>
-            <a:xfrm rot="10800000">
-              <a:off x="5896080" y="5485680"/>
-              <a:ext cx="252000" cy="0"/>
-            </a:xfrm>
-            <a:prstGeom prst="straightConnector1">
-              <a:avLst/>
-            </a:prstGeom>
-            <a:noFill/>
-            <a:ln w="29150" cap="flat" cmpd="sng">
-              <a:solidFill>
-                <a:srgbClr val="000000"/>
-              </a:solidFill>
-              <a:prstDash val="solid"/>
-              <a:round/>
-              <a:headEnd type="none" w="sm" len="sm"/>
-              <a:tailEnd type="none" w="sm" len="sm"/>
-            </a:ln>
-          </p:spPr>
-        </p:cxnSp>
-      </p:grpSp>
-      <p:sp>
-        <p:nvSpPr>
-          <p:cNvPr id="137" name="Google Shape;137;p15"/>
-          <p:cNvSpPr txBox="1"/>
-          <p:nvPr/>
-        </p:nvSpPr>
-        <p:spPr>
-          <a:xfrm>
-            <a:off x="7505275" y="3388159"/>
-            <a:ext cx="1139700" cy="350400"/>
-          </a:xfrm>
-          <a:prstGeom prst="rect">
-            <a:avLst/>
-          </a:prstGeom>
-          <a:noFill/>
-          <a:ln>
-            <a:noFill/>
-          </a:ln>
-        </p:spPr>
-        <p:txBody>
-          <a:bodyPr spcFirstLastPara="1" wrap="square" lIns="81625" tIns="40825" rIns="81625" bIns="40825" anchor="t" anchorCtr="0">
-            <a:noAutofit/>
-          </a:bodyPr>
-          <a:lstStyle/>
-          <a:p>
-            <a:pPr marL="0" marR="0" lvl="0" indent="0" algn="ctr" rtl="0">
-              <a:spcBef>
-                <a:spcPts val="0"/>
-              </a:spcBef>
-              <a:spcAft>
-                <a:spcPts val="0"/>
-              </a:spcAft>
-              <a:buNone/>
-            </a:pPr>
-            <a:endParaRPr sz="900" b="0" strike="noStrike" dirty="0">
-              <a:latin typeface="Arial"/>
-              <a:ea typeface="Arial"/>
-              <a:cs typeface="Arial"/>
-              <a:sym typeface="Arial"/>
-            </a:endParaRPr>
-          </a:p>
-        </p:txBody>
-      </p:sp>
       <p:grpSp>
         <p:nvGrpSpPr>
           <p:cNvPr id="142" name="Google Shape;142;p15"/>
@@ -8927,7 +8283,7 @@
         </p:nvGrpSpPr>
         <p:grpSpPr>
           <a:xfrm>
-            <a:off x="8344340" y="4092050"/>
+            <a:off x="8344326" y="4185765"/>
             <a:ext cx="348109" cy="225324"/>
             <a:chOff x="5957280" y="2713680"/>
             <a:chExt cx="383760" cy="248400"/>
@@ -9117,228 +8473,6 @@
         <p:cxnSp>
           <p:nvCxnSpPr>
             <p:cNvPr id="144" name="Google Shape;144;p15"/>
-            <p:cNvCxnSpPr/>
-            <p:nvPr/>
-          </p:nvCxnSpPr>
-          <p:spPr>
-            <a:xfrm>
-              <a:off x="5957280" y="2837520"/>
-              <a:ext cx="252000" cy="0"/>
-            </a:xfrm>
-            <a:prstGeom prst="straightConnector1">
-              <a:avLst/>
-            </a:prstGeom>
-            <a:noFill/>
-            <a:ln w="29150" cap="flat" cmpd="sng">
-              <a:solidFill>
-                <a:srgbClr val="000000"/>
-              </a:solidFill>
-              <a:prstDash val="solid"/>
-              <a:round/>
-              <a:headEnd type="none" w="sm" len="sm"/>
-              <a:tailEnd type="none" w="sm" len="sm"/>
-            </a:ln>
-          </p:spPr>
-        </p:cxnSp>
-      </p:grpSp>
-      <p:grpSp>
-        <p:nvGrpSpPr>
-          <p:cNvPr id="145" name="Google Shape;145;p15"/>
-          <p:cNvGrpSpPr/>
-          <p:nvPr/>
-        </p:nvGrpSpPr>
-        <p:grpSpPr>
-          <a:xfrm>
-            <a:off x="5165364" y="3759739"/>
-            <a:ext cx="348109" cy="225324"/>
-            <a:chOff x="5957280" y="2713680"/>
-            <a:chExt cx="383760" cy="248400"/>
-          </a:xfrm>
-        </p:grpSpPr>
-        <p:sp>
-          <p:nvSpPr>
-            <p:cNvPr id="146" name="Google Shape;146;p15"/>
-            <p:cNvSpPr/>
-            <p:nvPr/>
-          </p:nvSpPr>
-          <p:spPr>
-            <a:xfrm>
-              <a:off x="6213600" y="2713680"/>
-              <a:ext cx="127440" cy="248400"/>
-            </a:xfrm>
-            <a:custGeom>
-              <a:avLst/>
-              <a:gdLst/>
-              <a:ahLst/>
-              <a:cxnLst/>
-              <a:rect l="l" t="t" r="r" b="b"/>
-              <a:pathLst>
-                <a:path w="354" h="690" extrusionOk="0">
-                  <a:moveTo>
-                    <a:pt x="352" y="0"/>
-                  </a:moveTo>
-                  <a:cubicBezTo>
-                    <a:pt x="351" y="0"/>
-                    <a:pt x="351" y="0"/>
-                    <a:pt x="350" y="1"/>
-                  </a:cubicBezTo>
-                  <a:cubicBezTo>
-                    <a:pt x="350" y="1"/>
-                    <a:pt x="349" y="1"/>
-                    <a:pt x="349" y="2"/>
-                  </a:cubicBezTo>
-                  <a:cubicBezTo>
-                    <a:pt x="348" y="3"/>
-                    <a:pt x="348" y="3"/>
-                    <a:pt x="348" y="4"/>
-                  </a:cubicBezTo>
-                  <a:lnTo>
-                    <a:pt x="348" y="8"/>
-                  </a:lnTo>
-                  <a:cubicBezTo>
-                    <a:pt x="347" y="8"/>
-                    <a:pt x="346" y="8"/>
-                    <a:pt x="345" y="8"/>
-                  </a:cubicBezTo>
-                  <a:cubicBezTo>
-                    <a:pt x="298" y="8"/>
-                    <a:pt x="252" y="17"/>
-                    <a:pt x="211" y="33"/>
-                  </a:cubicBezTo>
-                  <a:cubicBezTo>
-                    <a:pt x="171" y="50"/>
-                    <a:pt x="135" y="75"/>
-                    <a:pt x="104" y="104"/>
-                  </a:cubicBezTo>
-                  <a:cubicBezTo>
-                    <a:pt x="75" y="135"/>
-                    <a:pt x="50" y="171"/>
-                    <a:pt x="33" y="211"/>
-                  </a:cubicBezTo>
-                  <a:cubicBezTo>
-                    <a:pt x="17" y="252"/>
-                    <a:pt x="8" y="298"/>
-                    <a:pt x="8" y="345"/>
-                  </a:cubicBezTo>
-                  <a:cubicBezTo>
-                    <a:pt x="8" y="392"/>
-                    <a:pt x="17" y="437"/>
-                    <a:pt x="33" y="478"/>
-                  </a:cubicBezTo>
-                  <a:cubicBezTo>
-                    <a:pt x="50" y="519"/>
-                    <a:pt x="75" y="555"/>
-                    <a:pt x="104" y="585"/>
-                  </a:cubicBezTo>
-                  <a:cubicBezTo>
-                    <a:pt x="135" y="615"/>
-                    <a:pt x="171" y="640"/>
-                    <a:pt x="211" y="656"/>
-                  </a:cubicBezTo>
-                  <a:cubicBezTo>
-                    <a:pt x="252" y="673"/>
-                    <a:pt x="298" y="683"/>
-                    <a:pt x="345" y="683"/>
-                  </a:cubicBezTo>
-                  <a:cubicBezTo>
-                    <a:pt x="346" y="683"/>
-                    <a:pt x="347" y="683"/>
-                    <a:pt x="348" y="683"/>
-                  </a:cubicBezTo>
-                  <a:lnTo>
-                    <a:pt x="348" y="689"/>
-                  </a:lnTo>
-                  <a:cubicBezTo>
-                    <a:pt x="347" y="689"/>
-                    <a:pt x="346" y="689"/>
-                    <a:pt x="345" y="689"/>
-                  </a:cubicBezTo>
-                  <a:cubicBezTo>
-                    <a:pt x="296" y="689"/>
-                    <a:pt x="250" y="680"/>
-                    <a:pt x="208" y="663"/>
-                  </a:cubicBezTo>
-                  <a:cubicBezTo>
-                    <a:pt x="167" y="646"/>
-                    <a:pt x="130" y="621"/>
-                    <a:pt x="99" y="590"/>
-                  </a:cubicBezTo>
-                  <a:cubicBezTo>
-                    <a:pt x="68" y="559"/>
-                    <a:pt x="43" y="522"/>
-                    <a:pt x="27" y="481"/>
-                  </a:cubicBezTo>
-                  <a:cubicBezTo>
-                    <a:pt x="10" y="439"/>
-                    <a:pt x="0" y="393"/>
-                    <a:pt x="0" y="345"/>
-                  </a:cubicBezTo>
-                  <a:cubicBezTo>
-                    <a:pt x="0" y="296"/>
-                    <a:pt x="10" y="250"/>
-                    <a:pt x="27" y="208"/>
-                  </a:cubicBezTo>
-                  <a:cubicBezTo>
-                    <a:pt x="43" y="167"/>
-                    <a:pt x="68" y="130"/>
-                    <a:pt x="99" y="99"/>
-                  </a:cubicBezTo>
-                  <a:cubicBezTo>
-                    <a:pt x="130" y="68"/>
-                    <a:pt x="167" y="43"/>
-                    <a:pt x="208" y="27"/>
-                  </a:cubicBezTo>
-                  <a:cubicBezTo>
-                    <a:pt x="250" y="10"/>
-                    <a:pt x="296" y="0"/>
-                    <a:pt x="345" y="0"/>
-                  </a:cubicBezTo>
-                  <a:cubicBezTo>
-                    <a:pt x="347" y="0"/>
-                    <a:pt x="350" y="0"/>
-                    <a:pt x="353" y="0"/>
-                  </a:cubicBezTo>
-                  <a:lnTo>
-                    <a:pt x="352" y="0"/>
-                  </a:lnTo>
-                </a:path>
-              </a:pathLst>
-            </a:custGeom>
-            <a:solidFill>
-              <a:srgbClr val="000000"/>
-            </a:solidFill>
-            <a:ln w="29150" cap="flat" cmpd="sng">
-              <a:solidFill>
-                <a:srgbClr val="000000"/>
-              </a:solidFill>
-              <a:prstDash val="solid"/>
-              <a:round/>
-              <a:headEnd type="none" w="sm" len="sm"/>
-              <a:tailEnd type="none" w="sm" len="sm"/>
-            </a:ln>
-          </p:spPr>
-          <p:txBody>
-            <a:bodyPr spcFirstLastPara="1" wrap="square" lIns="82925" tIns="82925" rIns="82925" bIns="82925" anchor="ctr" anchorCtr="0">
-              <a:noAutofit/>
-            </a:bodyPr>
-            <a:lstStyle/>
-            <a:p>
-              <a:pPr marL="0" lvl="0" indent="0" algn="l" rtl="0">
-                <a:spcBef>
-                  <a:spcPts val="0"/>
-                </a:spcBef>
-                <a:spcAft>
-                  <a:spcPts val="0"/>
-                </a:spcAft>
-                <a:buNone/>
-              </a:pPr>
-              <a:endParaRPr/>
-            </a:p>
-          </p:txBody>
-        </p:sp>
-        <p:cxnSp>
-          <p:nvCxnSpPr>
-            <p:cNvPr id="147" name="Google Shape;147;p15"/>
             <p:cNvCxnSpPr/>
             <p:nvPr/>
           </p:nvCxnSpPr>
@@ -9417,8 +8551,8 @@
         </p:nvSpPr>
         <p:spPr>
           <a:xfrm>
-            <a:off x="5530530" y="2281386"/>
-            <a:ext cx="593282" cy="1153300"/>
+            <a:off x="5530530" y="1425580"/>
+            <a:ext cx="593282" cy="2009105"/>
           </a:xfrm>
           <a:custGeom>
             <a:avLst/>
@@ -9469,7 +8603,7 @@
         </p:nvSpPr>
         <p:spPr>
           <a:xfrm>
-            <a:off x="7420574" y="3009451"/>
+            <a:off x="8122585" y="3268174"/>
             <a:ext cx="1139700" cy="216000"/>
           </a:xfrm>
           <a:prstGeom prst="rect">
@@ -9502,7 +8636,7 @@
                 <a:cs typeface="Verdana"/>
                 <a:sym typeface="Verdana"/>
               </a:rPr>
-              <a:t>Solicita Entrega Pedido</a:t>
+              <a:t>Consultar Endereço Entrega</a:t>
             </a:r>
             <a:endParaRPr sz="900" b="0" strike="noStrike" dirty="0">
               <a:latin typeface="Arial"/>
@@ -9515,10 +8649,10 @@
       </p:sp>
       <p:grpSp>
         <p:nvGrpSpPr>
-          <p:cNvPr id="151" name="Google Shape;102;p15">
+          <p:cNvPr id="86" name="Google Shape;111;p15">
             <a:extLst>
               <a:ext uri="{FF2B5EF4-FFF2-40B4-BE49-F238E27FC236}">
-                <a16:creationId xmlns:a16="http://schemas.microsoft.com/office/drawing/2014/main" id="{CF0D5BFC-F456-468A-9106-96FF453E8BD6}"/>
+                <a16:creationId xmlns:a16="http://schemas.microsoft.com/office/drawing/2014/main" id="{AB2F717D-AB00-4163-BE62-A291FE5733B1}"/>
               </a:ext>
             </a:extLst>
           </p:cNvPr>
@@ -9526,19 +8660,19 @@
           <p:nvPr/>
         </p:nvGrpSpPr>
         <p:grpSpPr>
-          <a:xfrm rot="15986097" flipH="1">
-            <a:off x="7174694" y="2665685"/>
-            <a:ext cx="182521" cy="398396"/>
-            <a:chOff x="5891400" y="4307040"/>
-            <a:chExt cx="383760" cy="248400"/>
+          <a:xfrm rot="16200000">
+            <a:off x="7016854" y="1826560"/>
+            <a:ext cx="449014" cy="220970"/>
+            <a:chOff x="6948000" y="3392280"/>
+            <a:chExt cx="495000" cy="243600"/>
           </a:xfrm>
         </p:grpSpPr>
         <p:sp>
           <p:nvSpPr>
-            <p:cNvPr id="152" name="Google Shape;103;p15">
+            <p:cNvPr id="87" name="Google Shape;112;p15">
               <a:extLst>
                 <a:ext uri="{FF2B5EF4-FFF2-40B4-BE49-F238E27FC236}">
-                  <a16:creationId xmlns:a16="http://schemas.microsoft.com/office/drawing/2014/main" id="{B74414BA-E41E-4250-906E-6E61A1706319}"/>
+                  <a16:creationId xmlns:a16="http://schemas.microsoft.com/office/drawing/2014/main" id="{9693957D-3DF5-4356-9649-C80D71AB6062}"/>
                 </a:ext>
               </a:extLst>
             </p:cNvPr>
@@ -9547,7 +8681,112 @@
           </p:nvSpPr>
           <p:spPr>
             <a:xfrm>
-              <a:off x="6147720" y="4307040"/>
+              <a:off x="6948000" y="3392280"/>
+              <a:ext cx="243000" cy="243600"/>
+            </a:xfrm>
+            <a:prstGeom prst="ellipse">
+              <a:avLst/>
+            </a:prstGeom>
+            <a:solidFill>
+              <a:srgbClr val="FFFFFF"/>
+            </a:solidFill>
+            <a:ln w="29150" cap="flat" cmpd="sng">
+              <a:solidFill>
+                <a:srgbClr val="000000"/>
+              </a:solidFill>
+              <a:prstDash val="solid"/>
+              <a:round/>
+              <a:headEnd type="none" w="sm" len="sm"/>
+              <a:tailEnd type="none" w="sm" len="sm"/>
+            </a:ln>
+          </p:spPr>
+          <p:txBody>
+            <a:bodyPr spcFirstLastPara="1" wrap="square" lIns="82925" tIns="82925" rIns="82925" bIns="82925" anchor="ctr" anchorCtr="0">
+              <a:noAutofit/>
+            </a:bodyPr>
+            <a:lstStyle/>
+            <a:p>
+              <a:pPr marL="0" lvl="0" indent="0" algn="l" rtl="0">
+                <a:spcBef>
+                  <a:spcPts val="0"/>
+                </a:spcBef>
+                <a:spcAft>
+                  <a:spcPts val="0"/>
+                </a:spcAft>
+                <a:buNone/>
+              </a:pPr>
+              <a:endParaRPr/>
+            </a:p>
+          </p:txBody>
+        </p:sp>
+        <p:cxnSp>
+          <p:nvCxnSpPr>
+            <p:cNvPr id="88" name="Google Shape;113;p15">
+              <a:extLst>
+                <a:ext uri="{FF2B5EF4-FFF2-40B4-BE49-F238E27FC236}">
+                  <a16:creationId xmlns:a16="http://schemas.microsoft.com/office/drawing/2014/main" id="{A2D7AA05-FF40-46D1-8A3F-CB8516983A1D}"/>
+                </a:ext>
+              </a:extLst>
+            </p:cNvPr>
+            <p:cNvCxnSpPr/>
+            <p:nvPr/>
+          </p:nvCxnSpPr>
+          <p:spPr>
+            <a:xfrm>
+              <a:off x="7191000" y="3513960"/>
+              <a:ext cx="252000" cy="0"/>
+            </a:xfrm>
+            <a:prstGeom prst="straightConnector1">
+              <a:avLst/>
+            </a:prstGeom>
+            <a:noFill/>
+            <a:ln w="29150" cap="flat" cmpd="sng">
+              <a:solidFill>
+                <a:srgbClr val="000000"/>
+              </a:solidFill>
+              <a:prstDash val="solid"/>
+              <a:round/>
+              <a:headEnd type="none" w="sm" len="sm"/>
+              <a:tailEnd type="none" w="sm" len="sm"/>
+            </a:ln>
+          </p:spPr>
+        </p:cxnSp>
+      </p:grpSp>
+      <p:grpSp>
+        <p:nvGrpSpPr>
+          <p:cNvPr id="108" name="Google Shape;145;p15">
+            <a:extLst>
+              <a:ext uri="{FF2B5EF4-FFF2-40B4-BE49-F238E27FC236}">
+                <a16:creationId xmlns:a16="http://schemas.microsoft.com/office/drawing/2014/main" id="{DF60FCDC-7F3C-47B6-9CBD-1EB1A0C3F986}"/>
+              </a:ext>
+            </a:extLst>
+          </p:cNvPr>
+          <p:cNvGrpSpPr/>
+          <p:nvPr/>
+        </p:nvGrpSpPr>
+        <p:grpSpPr>
+          <a:xfrm rot="16200000">
+            <a:off x="7122808" y="3589897"/>
+            <a:ext cx="348109" cy="225324"/>
+            <a:chOff x="5957280" y="2713680"/>
+            <a:chExt cx="383760" cy="248400"/>
+          </a:xfrm>
+        </p:grpSpPr>
+        <p:sp>
+          <p:nvSpPr>
+            <p:cNvPr id="109" name="Google Shape;146;p15">
+              <a:extLst>
+                <a:ext uri="{FF2B5EF4-FFF2-40B4-BE49-F238E27FC236}">
+                  <a16:creationId xmlns:a16="http://schemas.microsoft.com/office/drawing/2014/main" id="{22721848-ABB7-4B35-8D6A-5E5C73B099CF}"/>
+                </a:ext>
+              </a:extLst>
+            </p:cNvPr>
+            <p:cNvSpPr/>
+            <p:nvPr/>
+          </p:nvSpPr>
+          <p:spPr>
+            <a:xfrm>
+              <a:off x="6213600" y="2713680"/>
               <a:ext cx="127440" cy="248400"/>
             </a:xfrm>
             <a:custGeom>
@@ -9722,10 +8961,10 @@
         </p:sp>
         <p:cxnSp>
           <p:nvCxnSpPr>
-            <p:cNvPr id="153" name="Google Shape;104;p15">
+            <p:cNvPr id="110" name="Google Shape;147;p15">
               <a:extLst>
                 <a:ext uri="{FF2B5EF4-FFF2-40B4-BE49-F238E27FC236}">
-                  <a16:creationId xmlns:a16="http://schemas.microsoft.com/office/drawing/2014/main" id="{AE6321F2-43FC-424E-8022-3685D244C235}"/>
+                  <a16:creationId xmlns:a16="http://schemas.microsoft.com/office/drawing/2014/main" id="{2C921C16-86F8-4979-BB15-5DDA459BE90D}"/>
                 </a:ext>
               </a:extLst>
             </p:cNvPr>
@@ -9734,7 +8973,7 @@
           </p:nvCxnSpPr>
           <p:spPr>
             <a:xfrm>
-              <a:off x="5891400" y="4430880"/>
+              <a:off x="5957280" y="2837520"/>
               <a:ext cx="252000" cy="0"/>
             </a:xfrm>
             <a:prstGeom prst="straightConnector1">
@@ -9753,6 +8992,356 @@
           </p:spPr>
         </p:cxnSp>
       </p:grpSp>
+      <p:sp>
+        <p:nvSpPr>
+          <p:cNvPr id="123" name="Google Shape;209;p17">
+            <a:extLst>
+              <a:ext uri="{FF2B5EF4-FFF2-40B4-BE49-F238E27FC236}">
+                <a16:creationId xmlns:a16="http://schemas.microsoft.com/office/drawing/2014/main" id="{6336574D-DA6B-4FF2-937C-92041F6799FB}"/>
+              </a:ext>
+            </a:extLst>
+          </p:cNvPr>
+          <p:cNvSpPr/>
+          <p:nvPr/>
+        </p:nvSpPr>
+        <p:spPr>
+          <a:xfrm>
+            <a:off x="7278518" y="2148485"/>
+            <a:ext cx="45719" cy="1376101"/>
+          </a:xfrm>
+          <a:custGeom>
+            <a:avLst/>
+            <a:gdLst/>
+            <a:ahLst/>
+            <a:cxnLst/>
+            <a:rect l="l" t="t" r="r" b="b"/>
+            <a:pathLst>
+              <a:path w="1579" h="2598" extrusionOk="0">
+                <a:moveTo>
+                  <a:pt x="1335" y="0"/>
+                </a:moveTo>
+                <a:lnTo>
+                  <a:pt x="0" y="0"/>
+                </a:lnTo>
+                <a:lnTo>
+                  <a:pt x="0" y="2597"/>
+                </a:lnTo>
+                <a:lnTo>
+                  <a:pt x="1578" y="2597"/>
+                </a:lnTo>
+              </a:path>
+            </a:pathLst>
+          </a:custGeom>
+          <a:noFill/>
+          <a:ln w="29150" cap="flat" cmpd="sng">
+            <a:solidFill>
+              <a:srgbClr val="000000"/>
+            </a:solidFill>
+            <a:prstDash val="dash"/>
+            <a:round/>
+            <a:headEnd type="none" w="sm" len="sm"/>
+            <a:tailEnd type="none" w="sm" len="sm"/>
+          </a:ln>
+        </p:spPr>
+      </p:sp>
+      <p:grpSp>
+        <p:nvGrpSpPr>
+          <p:cNvPr id="124" name="Google Shape;142;p15">
+            <a:extLst>
+              <a:ext uri="{FF2B5EF4-FFF2-40B4-BE49-F238E27FC236}">
+                <a16:creationId xmlns:a16="http://schemas.microsoft.com/office/drawing/2014/main" id="{7F92D0CF-AF88-4454-8356-2CE944370BAC}"/>
+              </a:ext>
+            </a:extLst>
+          </p:cNvPr>
+          <p:cNvGrpSpPr/>
+          <p:nvPr/>
+        </p:nvGrpSpPr>
+        <p:grpSpPr>
+          <a:xfrm>
+            <a:off x="8360622" y="3840828"/>
+            <a:ext cx="348109" cy="225324"/>
+            <a:chOff x="5957280" y="2713680"/>
+            <a:chExt cx="383760" cy="248400"/>
+          </a:xfrm>
+        </p:grpSpPr>
+        <p:sp>
+          <p:nvSpPr>
+            <p:cNvPr id="125" name="Google Shape;143;p15">
+              <a:extLst>
+                <a:ext uri="{FF2B5EF4-FFF2-40B4-BE49-F238E27FC236}">
+                  <a16:creationId xmlns:a16="http://schemas.microsoft.com/office/drawing/2014/main" id="{32CF1E7A-D970-4DBB-89D1-DEF017628A7E}"/>
+                </a:ext>
+              </a:extLst>
+            </p:cNvPr>
+            <p:cNvSpPr/>
+            <p:nvPr/>
+          </p:nvSpPr>
+          <p:spPr>
+            <a:xfrm>
+              <a:off x="6213600" y="2713680"/>
+              <a:ext cx="127440" cy="248400"/>
+            </a:xfrm>
+            <a:custGeom>
+              <a:avLst/>
+              <a:gdLst/>
+              <a:ahLst/>
+              <a:cxnLst/>
+              <a:rect l="l" t="t" r="r" b="b"/>
+              <a:pathLst>
+                <a:path w="354" h="690" extrusionOk="0">
+                  <a:moveTo>
+                    <a:pt x="352" y="0"/>
+                  </a:moveTo>
+                  <a:cubicBezTo>
+                    <a:pt x="351" y="0"/>
+                    <a:pt x="351" y="0"/>
+                    <a:pt x="350" y="1"/>
+                  </a:cubicBezTo>
+                  <a:cubicBezTo>
+                    <a:pt x="350" y="1"/>
+                    <a:pt x="349" y="1"/>
+                    <a:pt x="349" y="2"/>
+                  </a:cubicBezTo>
+                  <a:cubicBezTo>
+                    <a:pt x="348" y="3"/>
+                    <a:pt x="348" y="3"/>
+                    <a:pt x="348" y="4"/>
+                  </a:cubicBezTo>
+                  <a:lnTo>
+                    <a:pt x="348" y="8"/>
+                  </a:lnTo>
+                  <a:cubicBezTo>
+                    <a:pt x="347" y="8"/>
+                    <a:pt x="346" y="8"/>
+                    <a:pt x="345" y="8"/>
+                  </a:cubicBezTo>
+                  <a:cubicBezTo>
+                    <a:pt x="298" y="8"/>
+                    <a:pt x="252" y="17"/>
+                    <a:pt x="211" y="33"/>
+                  </a:cubicBezTo>
+                  <a:cubicBezTo>
+                    <a:pt x="171" y="50"/>
+                    <a:pt x="135" y="75"/>
+                    <a:pt x="104" y="104"/>
+                  </a:cubicBezTo>
+                  <a:cubicBezTo>
+                    <a:pt x="75" y="135"/>
+                    <a:pt x="50" y="171"/>
+                    <a:pt x="33" y="211"/>
+                  </a:cubicBezTo>
+                  <a:cubicBezTo>
+                    <a:pt x="17" y="252"/>
+                    <a:pt x="8" y="298"/>
+                    <a:pt x="8" y="345"/>
+                  </a:cubicBezTo>
+                  <a:cubicBezTo>
+                    <a:pt x="8" y="392"/>
+                    <a:pt x="17" y="437"/>
+                    <a:pt x="33" y="478"/>
+                  </a:cubicBezTo>
+                  <a:cubicBezTo>
+                    <a:pt x="50" y="519"/>
+                    <a:pt x="75" y="555"/>
+                    <a:pt x="104" y="585"/>
+                  </a:cubicBezTo>
+                  <a:cubicBezTo>
+                    <a:pt x="135" y="615"/>
+                    <a:pt x="171" y="640"/>
+                    <a:pt x="211" y="656"/>
+                  </a:cubicBezTo>
+                  <a:cubicBezTo>
+                    <a:pt x="252" y="673"/>
+                    <a:pt x="298" y="683"/>
+                    <a:pt x="345" y="683"/>
+                  </a:cubicBezTo>
+                  <a:cubicBezTo>
+                    <a:pt x="346" y="683"/>
+                    <a:pt x="347" y="683"/>
+                    <a:pt x="348" y="683"/>
+                  </a:cubicBezTo>
+                  <a:lnTo>
+                    <a:pt x="348" y="689"/>
+                  </a:lnTo>
+                  <a:cubicBezTo>
+                    <a:pt x="347" y="689"/>
+                    <a:pt x="346" y="689"/>
+                    <a:pt x="345" y="689"/>
+                  </a:cubicBezTo>
+                  <a:cubicBezTo>
+                    <a:pt x="296" y="689"/>
+                    <a:pt x="250" y="680"/>
+                    <a:pt x="208" y="663"/>
+                  </a:cubicBezTo>
+                  <a:cubicBezTo>
+                    <a:pt x="167" y="646"/>
+                    <a:pt x="130" y="621"/>
+                    <a:pt x="99" y="590"/>
+                  </a:cubicBezTo>
+                  <a:cubicBezTo>
+                    <a:pt x="68" y="559"/>
+                    <a:pt x="43" y="522"/>
+                    <a:pt x="27" y="481"/>
+                  </a:cubicBezTo>
+                  <a:cubicBezTo>
+                    <a:pt x="10" y="439"/>
+                    <a:pt x="0" y="393"/>
+                    <a:pt x="0" y="345"/>
+                  </a:cubicBezTo>
+                  <a:cubicBezTo>
+                    <a:pt x="0" y="296"/>
+                    <a:pt x="10" y="250"/>
+                    <a:pt x="27" y="208"/>
+                  </a:cubicBezTo>
+                  <a:cubicBezTo>
+                    <a:pt x="43" y="167"/>
+                    <a:pt x="68" y="130"/>
+                    <a:pt x="99" y="99"/>
+                  </a:cubicBezTo>
+                  <a:cubicBezTo>
+                    <a:pt x="130" y="68"/>
+                    <a:pt x="167" y="43"/>
+                    <a:pt x="208" y="27"/>
+                  </a:cubicBezTo>
+                  <a:cubicBezTo>
+                    <a:pt x="250" y="10"/>
+                    <a:pt x="296" y="0"/>
+                    <a:pt x="345" y="0"/>
+                  </a:cubicBezTo>
+                  <a:cubicBezTo>
+                    <a:pt x="347" y="0"/>
+                    <a:pt x="350" y="0"/>
+                    <a:pt x="353" y="0"/>
+                  </a:cubicBezTo>
+                  <a:lnTo>
+                    <a:pt x="352" y="0"/>
+                  </a:lnTo>
+                </a:path>
+              </a:pathLst>
+            </a:custGeom>
+            <a:solidFill>
+              <a:srgbClr val="000000"/>
+            </a:solidFill>
+            <a:ln w="29150" cap="flat" cmpd="sng">
+              <a:solidFill>
+                <a:srgbClr val="000000"/>
+              </a:solidFill>
+              <a:prstDash val="solid"/>
+              <a:round/>
+              <a:headEnd type="none" w="sm" len="sm"/>
+              <a:tailEnd type="none" w="sm" len="sm"/>
+            </a:ln>
+          </p:spPr>
+          <p:txBody>
+            <a:bodyPr spcFirstLastPara="1" wrap="square" lIns="82925" tIns="82925" rIns="82925" bIns="82925" anchor="ctr" anchorCtr="0">
+              <a:noAutofit/>
+            </a:bodyPr>
+            <a:lstStyle/>
+            <a:p>
+              <a:pPr marL="0" lvl="0" indent="0" algn="l" rtl="0">
+                <a:spcBef>
+                  <a:spcPts val="0"/>
+                </a:spcBef>
+                <a:spcAft>
+                  <a:spcPts val="0"/>
+                </a:spcAft>
+                <a:buNone/>
+              </a:pPr>
+              <a:endParaRPr/>
+            </a:p>
+          </p:txBody>
+        </p:sp>
+        <p:cxnSp>
+          <p:nvCxnSpPr>
+            <p:cNvPr id="126" name="Google Shape;144;p15">
+              <a:extLst>
+                <a:ext uri="{FF2B5EF4-FFF2-40B4-BE49-F238E27FC236}">
+                  <a16:creationId xmlns:a16="http://schemas.microsoft.com/office/drawing/2014/main" id="{5CCE4CE8-B196-4C0F-A81D-97C88BDD2D6E}"/>
+                </a:ext>
+              </a:extLst>
+            </p:cNvPr>
+            <p:cNvCxnSpPr/>
+            <p:nvPr/>
+          </p:nvCxnSpPr>
+          <p:spPr>
+            <a:xfrm>
+              <a:off x="5957280" y="2837520"/>
+              <a:ext cx="252000" cy="0"/>
+            </a:xfrm>
+            <a:prstGeom prst="straightConnector1">
+              <a:avLst/>
+            </a:prstGeom>
+            <a:noFill/>
+            <a:ln w="29150" cap="flat" cmpd="sng">
+              <a:solidFill>
+                <a:srgbClr val="000000"/>
+              </a:solidFill>
+              <a:prstDash val="solid"/>
+              <a:round/>
+              <a:headEnd type="none" w="sm" len="sm"/>
+              <a:tailEnd type="none" w="sm" len="sm"/>
+            </a:ln>
+          </p:spPr>
+        </p:cxnSp>
+      </p:grpSp>
+      <p:sp>
+        <p:nvSpPr>
+          <p:cNvPr id="141" name="Google Shape;138;p15">
+            <a:extLst>
+              <a:ext uri="{FF2B5EF4-FFF2-40B4-BE49-F238E27FC236}">
+                <a16:creationId xmlns:a16="http://schemas.microsoft.com/office/drawing/2014/main" id="{3F55FF3B-7AB3-4F27-89F3-FF01A07FCD07}"/>
+              </a:ext>
+            </a:extLst>
+          </p:cNvPr>
+          <p:cNvSpPr txBox="1"/>
+          <p:nvPr/>
+        </p:nvSpPr>
+        <p:spPr>
+          <a:xfrm>
+            <a:off x="7329586" y="1833126"/>
+            <a:ext cx="1139700" cy="216000"/>
+          </a:xfrm>
+          <a:prstGeom prst="rect">
+            <a:avLst/>
+          </a:prstGeom>
+          <a:noFill/>
+          <a:ln>
+            <a:noFill/>
+          </a:ln>
+        </p:spPr>
+        <p:txBody>
+          <a:bodyPr spcFirstLastPara="1" wrap="square" lIns="81625" tIns="40825" rIns="81625" bIns="40825" anchor="t" anchorCtr="0">
+            <a:noAutofit/>
+          </a:bodyPr>
+          <a:lstStyle/>
+          <a:p>
+            <a:pPr marL="0" marR="0" lvl="0" indent="0" algn="ctr" rtl="0">
+              <a:spcBef>
+                <a:spcPts val="0"/>
+              </a:spcBef>
+              <a:spcAft>
+                <a:spcPts val="0"/>
+              </a:spcAft>
+              <a:buNone/>
+            </a:pPr>
+            <a:r>
+              <a:rPr lang="en" sz="900" b="0" strike="noStrike" dirty="0">
+                <a:latin typeface="Verdana"/>
+                <a:ea typeface="Verdana"/>
+                <a:cs typeface="Verdana"/>
+                <a:sym typeface="Verdana"/>
+              </a:rPr>
+              <a:t>Solicita Entrega Pedido</a:t>
+            </a:r>
+            <a:endParaRPr sz="900" b="0" strike="noStrike" dirty="0">
+              <a:latin typeface="Arial"/>
+              <a:ea typeface="Arial"/>
+              <a:cs typeface="Arial"/>
+              <a:sym typeface="Arial"/>
+            </a:endParaRPr>
+          </a:p>
+        </p:txBody>
+      </p:sp>
     </p:spTree>
   </p:cSld>
   <p:clrMapOvr>
@@ -9762,6 +9351,2836 @@
 </file>
 
 <file path=ppt/slides/slide3.xml><?xml version="1.0" encoding="utf-8"?>
+<p:sld xmlns:a="http://schemas.openxmlformats.org/drawingml/2006/main" xmlns:r="http://schemas.openxmlformats.org/officeDocument/2006/relationships" xmlns:p="http://schemas.openxmlformats.org/presentationml/2006/main">
+  <p:cSld>
+    <p:spTree>
+      <p:nvGrpSpPr>
+        <p:cNvPr id="1" name=""/>
+        <p:cNvGrpSpPr/>
+        <p:nvPr/>
+      </p:nvGrpSpPr>
+      <p:grpSpPr>
+        <a:xfrm>
+          <a:off x="0" y="0"/>
+          <a:ext cx="0" cy="0"/>
+          <a:chOff x="0" y="0"/>
+          <a:chExt cx="0" cy="0"/>
+        </a:xfrm>
+      </p:grpSpPr>
+      <p:sp>
+        <p:nvSpPr>
+          <p:cNvPr id="2" name="Google Shape;63;p15">
+            <a:extLst>
+              <a:ext uri="{FF2B5EF4-FFF2-40B4-BE49-F238E27FC236}">
+                <a16:creationId xmlns:a16="http://schemas.microsoft.com/office/drawing/2014/main" id="{51C7C004-D02A-451D-8230-EC83840CAC54}"/>
+              </a:ext>
+            </a:extLst>
+          </p:cNvPr>
+          <p:cNvSpPr/>
+          <p:nvPr/>
+        </p:nvSpPr>
+        <p:spPr>
+          <a:xfrm>
+            <a:off x="3160374" y="3349137"/>
+            <a:ext cx="922528" cy="781180"/>
+          </a:xfrm>
+          <a:prstGeom prst="rect">
+            <a:avLst/>
+          </a:prstGeom>
+          <a:solidFill>
+            <a:srgbClr val="FFFFFF"/>
+          </a:solidFill>
+          <a:ln w="29150" cap="flat" cmpd="sng">
+            <a:solidFill>
+              <a:srgbClr val="000000"/>
+            </a:solidFill>
+            <a:prstDash val="solid"/>
+            <a:round/>
+            <a:headEnd type="none" w="sm" len="sm"/>
+            <a:tailEnd type="none" w="sm" len="sm"/>
+          </a:ln>
+        </p:spPr>
+        <p:txBody>
+          <a:bodyPr spcFirstLastPara="1" wrap="square" lIns="94700" tIns="53875" rIns="94700" bIns="53875" anchor="ctr" anchorCtr="0">
+            <a:noAutofit/>
+          </a:bodyPr>
+          <a:lstStyle/>
+          <a:p>
+            <a:pPr marL="0" marR="0" lvl="0" indent="0" algn="ctr" rtl="0">
+              <a:spcBef>
+                <a:spcPts val="0"/>
+              </a:spcBef>
+              <a:spcAft>
+                <a:spcPts val="0"/>
+              </a:spcAft>
+              <a:buNone/>
+            </a:pPr>
+            <a:r>
+              <a:rPr lang="en" sz="1000" b="0" i="0" u="none" strike="noStrike" cap="none" dirty="0">
+                <a:solidFill>
+                  <a:srgbClr val="666666"/>
+                </a:solidFill>
+                <a:latin typeface="Verdana"/>
+                <a:ea typeface="Verdana"/>
+                <a:cs typeface="Verdana"/>
+                <a:sym typeface="Verdana"/>
+              </a:rPr>
+              <a:t>«component»</a:t>
+            </a:r>
+            <a:endParaRPr sz="1000" b="0" i="0" u="none" strike="noStrike" cap="none" dirty="0">
+              <a:latin typeface="Arial"/>
+              <a:ea typeface="Arial"/>
+              <a:cs typeface="Arial"/>
+              <a:sym typeface="Arial"/>
+            </a:endParaRPr>
+          </a:p>
+          <a:p>
+            <a:pPr marL="0" marR="0" lvl="0" indent="0" algn="ctr" rtl="0">
+              <a:spcBef>
+                <a:spcPts val="0"/>
+              </a:spcBef>
+              <a:spcAft>
+                <a:spcPts val="0"/>
+              </a:spcAft>
+              <a:buNone/>
+            </a:pPr>
+            <a:endParaRPr sz="1000" b="0" i="0" u="none" strike="noStrike" cap="none" dirty="0">
+              <a:latin typeface="Arial"/>
+              <a:ea typeface="Arial"/>
+              <a:cs typeface="Arial"/>
+              <a:sym typeface="Arial"/>
+            </a:endParaRPr>
+          </a:p>
+          <a:p>
+            <a:pPr marL="0" marR="0" lvl="0" indent="0" algn="ctr" rtl="0">
+              <a:spcBef>
+                <a:spcPts val="0"/>
+              </a:spcBef>
+              <a:spcAft>
+                <a:spcPts val="0"/>
+              </a:spcAft>
+              <a:buNone/>
+            </a:pPr>
+            <a:r>
+              <a:rPr lang="en" sz="1200" b="1" i="0" u="none" strike="noStrike" cap="none" dirty="0">
+                <a:latin typeface="Verdana"/>
+                <a:ea typeface="Verdana"/>
+                <a:cs typeface="Verdana"/>
+                <a:sym typeface="Verdana"/>
+              </a:rPr>
+              <a:t>Pedido</a:t>
+            </a:r>
+            <a:endParaRPr sz="1200" b="0" i="0" u="none" strike="noStrike" cap="none" dirty="0">
+              <a:latin typeface="Arial"/>
+              <a:ea typeface="Arial"/>
+              <a:cs typeface="Arial"/>
+              <a:sym typeface="Arial"/>
+            </a:endParaRPr>
+          </a:p>
+        </p:txBody>
+      </p:sp>
+      <p:grpSp>
+        <p:nvGrpSpPr>
+          <p:cNvPr id="3" name="Google Shape;114;p15">
+            <a:extLst>
+              <a:ext uri="{FF2B5EF4-FFF2-40B4-BE49-F238E27FC236}">
+                <a16:creationId xmlns:a16="http://schemas.microsoft.com/office/drawing/2014/main" id="{E4C5E003-0322-4158-9480-10A57B0B8508}"/>
+              </a:ext>
+            </a:extLst>
+          </p:cNvPr>
+          <p:cNvGrpSpPr/>
+          <p:nvPr/>
+        </p:nvGrpSpPr>
+        <p:grpSpPr>
+          <a:xfrm>
+            <a:off x="212910" y="1912160"/>
+            <a:ext cx="449015" cy="220970"/>
+            <a:chOff x="261000" y="2714760"/>
+            <a:chExt cx="495000" cy="243600"/>
+          </a:xfrm>
+        </p:grpSpPr>
+        <p:sp>
+          <p:nvSpPr>
+            <p:cNvPr id="4" name="Google Shape;115;p15">
+              <a:extLst>
+                <a:ext uri="{FF2B5EF4-FFF2-40B4-BE49-F238E27FC236}">
+                  <a16:creationId xmlns:a16="http://schemas.microsoft.com/office/drawing/2014/main" id="{C048F9E2-2A1A-4FCA-8385-FBE1CF466796}"/>
+                </a:ext>
+              </a:extLst>
+            </p:cNvPr>
+            <p:cNvSpPr/>
+            <p:nvPr/>
+          </p:nvSpPr>
+          <p:spPr>
+            <a:xfrm>
+              <a:off x="261000" y="2714760"/>
+              <a:ext cx="243000" cy="243600"/>
+            </a:xfrm>
+            <a:prstGeom prst="ellipse">
+              <a:avLst/>
+            </a:prstGeom>
+            <a:solidFill>
+              <a:srgbClr val="FFFFFF"/>
+            </a:solidFill>
+            <a:ln w="29150" cap="flat" cmpd="sng">
+              <a:solidFill>
+                <a:srgbClr val="000000"/>
+              </a:solidFill>
+              <a:prstDash val="solid"/>
+              <a:round/>
+              <a:headEnd type="none" w="sm" len="sm"/>
+              <a:tailEnd type="none" w="sm" len="sm"/>
+            </a:ln>
+          </p:spPr>
+          <p:txBody>
+            <a:bodyPr spcFirstLastPara="1" wrap="square" lIns="82925" tIns="82925" rIns="82925" bIns="82925" anchor="ctr" anchorCtr="0">
+              <a:noAutofit/>
+            </a:bodyPr>
+            <a:lstStyle/>
+            <a:p>
+              <a:pPr marL="0" lvl="0" indent="0" algn="l" rtl="0">
+                <a:spcBef>
+                  <a:spcPts val="0"/>
+                </a:spcBef>
+                <a:spcAft>
+                  <a:spcPts val="0"/>
+                </a:spcAft>
+                <a:buNone/>
+              </a:pPr>
+              <a:endParaRPr/>
+            </a:p>
+          </p:txBody>
+        </p:sp>
+        <p:cxnSp>
+          <p:nvCxnSpPr>
+            <p:cNvPr id="5" name="Google Shape;116;p15">
+              <a:extLst>
+                <a:ext uri="{FF2B5EF4-FFF2-40B4-BE49-F238E27FC236}">
+                  <a16:creationId xmlns:a16="http://schemas.microsoft.com/office/drawing/2014/main" id="{F53E2AFF-382B-4611-9D16-07EEF74A228A}"/>
+                </a:ext>
+              </a:extLst>
+            </p:cNvPr>
+            <p:cNvCxnSpPr/>
+            <p:nvPr/>
+          </p:nvCxnSpPr>
+          <p:spPr>
+            <a:xfrm>
+              <a:off x="504000" y="2836440"/>
+              <a:ext cx="252000" cy="0"/>
+            </a:xfrm>
+            <a:prstGeom prst="straightConnector1">
+              <a:avLst/>
+            </a:prstGeom>
+            <a:noFill/>
+            <a:ln w="29150" cap="flat" cmpd="sng">
+              <a:solidFill>
+                <a:srgbClr val="000000"/>
+              </a:solidFill>
+              <a:prstDash val="solid"/>
+              <a:round/>
+              <a:headEnd type="none" w="sm" len="sm"/>
+              <a:tailEnd type="none" w="sm" len="sm"/>
+            </a:ln>
+          </p:spPr>
+        </p:cxnSp>
+      </p:grpSp>
+      <p:sp>
+        <p:nvSpPr>
+          <p:cNvPr id="6" name="Google Shape;91;p15">
+            <a:extLst>
+              <a:ext uri="{FF2B5EF4-FFF2-40B4-BE49-F238E27FC236}">
+                <a16:creationId xmlns:a16="http://schemas.microsoft.com/office/drawing/2014/main" id="{5E3D00DD-F78B-4751-91F3-D5FB3A6D867F}"/>
+              </a:ext>
+            </a:extLst>
+          </p:cNvPr>
+          <p:cNvSpPr/>
+          <p:nvPr/>
+        </p:nvSpPr>
+        <p:spPr>
+          <a:xfrm>
+            <a:off x="2013093" y="1496765"/>
+            <a:ext cx="115599" cy="225313"/>
+          </a:xfrm>
+          <a:custGeom>
+            <a:avLst/>
+            <a:gdLst/>
+            <a:ahLst/>
+            <a:cxnLst/>
+            <a:rect l="l" t="t" r="r" b="b"/>
+            <a:pathLst>
+              <a:path w="354" h="690" extrusionOk="0">
+                <a:moveTo>
+                  <a:pt x="352" y="0"/>
+                </a:moveTo>
+                <a:cubicBezTo>
+                  <a:pt x="351" y="0"/>
+                  <a:pt x="351" y="0"/>
+                  <a:pt x="350" y="1"/>
+                </a:cubicBezTo>
+                <a:cubicBezTo>
+                  <a:pt x="350" y="1"/>
+                  <a:pt x="349" y="1"/>
+                  <a:pt x="349" y="2"/>
+                </a:cubicBezTo>
+                <a:cubicBezTo>
+                  <a:pt x="348" y="3"/>
+                  <a:pt x="348" y="3"/>
+                  <a:pt x="348" y="4"/>
+                </a:cubicBezTo>
+                <a:lnTo>
+                  <a:pt x="348" y="8"/>
+                </a:lnTo>
+                <a:cubicBezTo>
+                  <a:pt x="347" y="8"/>
+                  <a:pt x="346" y="8"/>
+                  <a:pt x="345" y="8"/>
+                </a:cubicBezTo>
+                <a:cubicBezTo>
+                  <a:pt x="298" y="8"/>
+                  <a:pt x="252" y="17"/>
+                  <a:pt x="211" y="33"/>
+                </a:cubicBezTo>
+                <a:cubicBezTo>
+                  <a:pt x="171" y="50"/>
+                  <a:pt x="135" y="75"/>
+                  <a:pt x="104" y="104"/>
+                </a:cubicBezTo>
+                <a:cubicBezTo>
+                  <a:pt x="75" y="135"/>
+                  <a:pt x="50" y="171"/>
+                  <a:pt x="33" y="211"/>
+                </a:cubicBezTo>
+                <a:cubicBezTo>
+                  <a:pt x="17" y="252"/>
+                  <a:pt x="8" y="298"/>
+                  <a:pt x="8" y="345"/>
+                </a:cubicBezTo>
+                <a:cubicBezTo>
+                  <a:pt x="8" y="392"/>
+                  <a:pt x="17" y="437"/>
+                  <a:pt x="33" y="478"/>
+                </a:cubicBezTo>
+                <a:cubicBezTo>
+                  <a:pt x="50" y="519"/>
+                  <a:pt x="75" y="555"/>
+                  <a:pt x="104" y="585"/>
+                </a:cubicBezTo>
+                <a:cubicBezTo>
+                  <a:pt x="135" y="615"/>
+                  <a:pt x="171" y="640"/>
+                  <a:pt x="211" y="656"/>
+                </a:cubicBezTo>
+                <a:cubicBezTo>
+                  <a:pt x="252" y="673"/>
+                  <a:pt x="298" y="683"/>
+                  <a:pt x="345" y="683"/>
+                </a:cubicBezTo>
+                <a:cubicBezTo>
+                  <a:pt x="346" y="683"/>
+                  <a:pt x="347" y="683"/>
+                  <a:pt x="348" y="683"/>
+                </a:cubicBezTo>
+                <a:lnTo>
+                  <a:pt x="348" y="689"/>
+                </a:lnTo>
+                <a:cubicBezTo>
+                  <a:pt x="347" y="689"/>
+                  <a:pt x="346" y="689"/>
+                  <a:pt x="345" y="689"/>
+                </a:cubicBezTo>
+                <a:cubicBezTo>
+                  <a:pt x="296" y="689"/>
+                  <a:pt x="250" y="680"/>
+                  <a:pt x="208" y="663"/>
+                </a:cubicBezTo>
+                <a:cubicBezTo>
+                  <a:pt x="167" y="646"/>
+                  <a:pt x="130" y="621"/>
+                  <a:pt x="99" y="590"/>
+                </a:cubicBezTo>
+                <a:cubicBezTo>
+                  <a:pt x="68" y="559"/>
+                  <a:pt x="43" y="522"/>
+                  <a:pt x="27" y="481"/>
+                </a:cubicBezTo>
+                <a:cubicBezTo>
+                  <a:pt x="10" y="439"/>
+                  <a:pt x="0" y="393"/>
+                  <a:pt x="0" y="345"/>
+                </a:cubicBezTo>
+                <a:cubicBezTo>
+                  <a:pt x="0" y="296"/>
+                  <a:pt x="10" y="250"/>
+                  <a:pt x="27" y="208"/>
+                </a:cubicBezTo>
+                <a:cubicBezTo>
+                  <a:pt x="43" y="167"/>
+                  <a:pt x="68" y="130"/>
+                  <a:pt x="99" y="99"/>
+                </a:cubicBezTo>
+                <a:cubicBezTo>
+                  <a:pt x="130" y="68"/>
+                  <a:pt x="167" y="43"/>
+                  <a:pt x="208" y="27"/>
+                </a:cubicBezTo>
+                <a:cubicBezTo>
+                  <a:pt x="250" y="10"/>
+                  <a:pt x="296" y="0"/>
+                  <a:pt x="345" y="0"/>
+                </a:cubicBezTo>
+                <a:cubicBezTo>
+                  <a:pt x="347" y="0"/>
+                  <a:pt x="350" y="0"/>
+                  <a:pt x="353" y="0"/>
+                </a:cubicBezTo>
+                <a:lnTo>
+                  <a:pt x="352" y="0"/>
+                </a:lnTo>
+              </a:path>
+            </a:pathLst>
+          </a:custGeom>
+          <a:solidFill>
+            <a:srgbClr val="000000"/>
+          </a:solidFill>
+          <a:ln w="29150" cap="flat" cmpd="sng">
+            <a:solidFill>
+              <a:srgbClr val="000000"/>
+            </a:solidFill>
+            <a:prstDash val="solid"/>
+            <a:round/>
+            <a:headEnd type="none" w="sm" len="sm"/>
+            <a:tailEnd type="none" w="sm" len="sm"/>
+          </a:ln>
+        </p:spPr>
+        <p:txBody>
+          <a:bodyPr spcFirstLastPara="1" wrap="square" lIns="82925" tIns="82925" rIns="82925" bIns="82925" anchor="ctr" anchorCtr="0">
+            <a:noAutofit/>
+          </a:bodyPr>
+          <a:lstStyle/>
+          <a:p>
+            <a:pPr marL="0" lvl="0" indent="0" algn="l" rtl="0">
+              <a:spcBef>
+                <a:spcPts val="0"/>
+              </a:spcBef>
+              <a:spcAft>
+                <a:spcPts val="0"/>
+              </a:spcAft>
+              <a:buNone/>
+            </a:pPr>
+            <a:endParaRPr/>
+          </a:p>
+        </p:txBody>
+      </p:sp>
+      <p:cxnSp>
+        <p:nvCxnSpPr>
+          <p:cNvPr id="7" name="Google Shape;92;p15">
+            <a:extLst>
+              <a:ext uri="{FF2B5EF4-FFF2-40B4-BE49-F238E27FC236}">
+                <a16:creationId xmlns:a16="http://schemas.microsoft.com/office/drawing/2014/main" id="{11E19C51-0950-45B3-916F-9B087E6F7B9E}"/>
+              </a:ext>
+            </a:extLst>
+          </p:cNvPr>
+          <p:cNvCxnSpPr/>
+          <p:nvPr/>
+        </p:nvCxnSpPr>
+        <p:spPr>
+          <a:xfrm>
+            <a:off x="1780588" y="1609095"/>
+            <a:ext cx="228600" cy="0"/>
+          </a:xfrm>
+          <a:prstGeom prst="straightConnector1">
+            <a:avLst/>
+          </a:prstGeom>
+          <a:noFill/>
+          <a:ln w="29150" cap="flat" cmpd="sng">
+            <a:solidFill>
+              <a:srgbClr val="000000"/>
+            </a:solidFill>
+            <a:prstDash val="solid"/>
+            <a:round/>
+            <a:headEnd type="none" w="sm" len="sm"/>
+            <a:tailEnd type="none" w="sm" len="sm"/>
+          </a:ln>
+        </p:spPr>
+      </p:cxnSp>
+      <p:sp>
+        <p:nvSpPr>
+          <p:cNvPr id="12" name="Google Shape;63;p15">
+            <a:extLst>
+              <a:ext uri="{FF2B5EF4-FFF2-40B4-BE49-F238E27FC236}">
+                <a16:creationId xmlns:a16="http://schemas.microsoft.com/office/drawing/2014/main" id="{69223321-BDB9-4722-95EF-21DF2A476E10}"/>
+              </a:ext>
+            </a:extLst>
+          </p:cNvPr>
+          <p:cNvSpPr/>
+          <p:nvPr/>
+        </p:nvSpPr>
+        <p:spPr>
+          <a:xfrm>
+            <a:off x="3674784" y="167188"/>
+            <a:ext cx="1615928" cy="814346"/>
+          </a:xfrm>
+          <a:prstGeom prst="rect">
+            <a:avLst/>
+          </a:prstGeom>
+          <a:solidFill>
+            <a:srgbClr val="FFFFFF"/>
+          </a:solidFill>
+          <a:ln w="29150" cap="flat" cmpd="sng">
+            <a:solidFill>
+              <a:srgbClr val="000000"/>
+            </a:solidFill>
+            <a:prstDash val="solid"/>
+            <a:round/>
+            <a:headEnd type="none" w="sm" len="sm"/>
+            <a:tailEnd type="none" w="sm" len="sm"/>
+          </a:ln>
+        </p:spPr>
+        <p:txBody>
+          <a:bodyPr spcFirstLastPara="1" wrap="square" lIns="94700" tIns="53875" rIns="94700" bIns="53875" anchor="ctr" anchorCtr="0">
+            <a:noAutofit/>
+          </a:bodyPr>
+          <a:lstStyle/>
+          <a:p>
+            <a:pPr marL="0" marR="0" lvl="0" indent="0" algn="ctr" rtl="0">
+              <a:spcBef>
+                <a:spcPts val="0"/>
+              </a:spcBef>
+              <a:spcAft>
+                <a:spcPts val="0"/>
+              </a:spcAft>
+              <a:buNone/>
+            </a:pPr>
+            <a:r>
+              <a:rPr lang="en" sz="1000" b="0" i="0" u="none" strike="noStrike" cap="none" dirty="0">
+                <a:solidFill>
+                  <a:srgbClr val="666666"/>
+                </a:solidFill>
+                <a:latin typeface="Verdana"/>
+                <a:ea typeface="Verdana"/>
+                <a:cs typeface="Verdana"/>
+                <a:sym typeface="Verdana"/>
+              </a:rPr>
+              <a:t>«component»</a:t>
+            </a:r>
+            <a:endParaRPr sz="1000" b="0" i="0" u="none" strike="noStrike" cap="none" dirty="0">
+              <a:latin typeface="Arial"/>
+              <a:ea typeface="Arial"/>
+              <a:cs typeface="Arial"/>
+              <a:sym typeface="Arial"/>
+            </a:endParaRPr>
+          </a:p>
+          <a:p>
+            <a:pPr marL="0" marR="0" lvl="0" indent="0" algn="ctr" rtl="0">
+              <a:spcBef>
+                <a:spcPts val="0"/>
+              </a:spcBef>
+              <a:spcAft>
+                <a:spcPts val="0"/>
+              </a:spcAft>
+              <a:buNone/>
+            </a:pPr>
+            <a:endParaRPr sz="1000" b="0" i="0" u="none" strike="noStrike" cap="none" dirty="0">
+              <a:latin typeface="Arial"/>
+              <a:ea typeface="Arial"/>
+              <a:cs typeface="Arial"/>
+              <a:sym typeface="Arial"/>
+            </a:endParaRPr>
+          </a:p>
+          <a:p>
+            <a:pPr marL="0" marR="0" lvl="0" indent="0" algn="ctr" rtl="0">
+              <a:spcBef>
+                <a:spcPts val="0"/>
+              </a:spcBef>
+              <a:spcAft>
+                <a:spcPts val="0"/>
+              </a:spcAft>
+              <a:buNone/>
+            </a:pPr>
+            <a:r>
+              <a:rPr lang="en" sz="1200" b="1" i="0" u="none" strike="noStrike" cap="none" dirty="0">
+                <a:latin typeface="Verdana"/>
+                <a:ea typeface="Verdana"/>
+                <a:cs typeface="Verdana"/>
+                <a:sym typeface="Verdana"/>
+              </a:rPr>
+              <a:t>Recomendação Refeição</a:t>
+            </a:r>
+            <a:endParaRPr sz="1200" b="0" i="0" u="none" strike="noStrike" cap="none" dirty="0">
+              <a:latin typeface="Arial"/>
+              <a:ea typeface="Arial"/>
+              <a:cs typeface="Arial"/>
+              <a:sym typeface="Arial"/>
+            </a:endParaRPr>
+          </a:p>
+        </p:txBody>
+      </p:sp>
+      <p:grpSp>
+        <p:nvGrpSpPr>
+          <p:cNvPr id="13" name="Google Shape;166;p16">
+            <a:extLst>
+              <a:ext uri="{FF2B5EF4-FFF2-40B4-BE49-F238E27FC236}">
+                <a16:creationId xmlns:a16="http://schemas.microsoft.com/office/drawing/2014/main" id="{4F5BEAA4-9074-494F-BB67-BC03A5BF153A}"/>
+              </a:ext>
+            </a:extLst>
+          </p:cNvPr>
+          <p:cNvGrpSpPr/>
+          <p:nvPr/>
+        </p:nvGrpSpPr>
+        <p:grpSpPr>
+          <a:xfrm>
+            <a:off x="3049524" y="574361"/>
+            <a:ext cx="625260" cy="221700"/>
+            <a:chOff x="4470180" y="4459680"/>
+            <a:chExt cx="625260" cy="221700"/>
+          </a:xfrm>
+        </p:grpSpPr>
+        <p:sp>
+          <p:nvSpPr>
+            <p:cNvPr id="14" name="Google Shape;167;p16">
+              <a:extLst>
+                <a:ext uri="{FF2B5EF4-FFF2-40B4-BE49-F238E27FC236}">
+                  <a16:creationId xmlns:a16="http://schemas.microsoft.com/office/drawing/2014/main" id="{AF1944A6-B244-48C6-9A97-ED003869ED28}"/>
+                </a:ext>
+              </a:extLst>
+            </p:cNvPr>
+            <p:cNvSpPr/>
+            <p:nvPr/>
+          </p:nvSpPr>
+          <p:spPr>
+            <a:xfrm flipH="1">
+              <a:off x="4470180" y="4459680"/>
+              <a:ext cx="221700" cy="221700"/>
+            </a:xfrm>
+            <a:prstGeom prst="ellipse">
+              <a:avLst/>
+            </a:prstGeom>
+            <a:solidFill>
+              <a:srgbClr val="FFFFFF"/>
+            </a:solidFill>
+            <a:ln w="29150" cap="flat" cmpd="sng">
+              <a:solidFill>
+                <a:srgbClr val="000000"/>
+              </a:solidFill>
+              <a:prstDash val="solid"/>
+              <a:round/>
+              <a:headEnd type="none" w="sm" len="sm"/>
+              <a:tailEnd type="none" w="sm" len="sm"/>
+            </a:ln>
+          </p:spPr>
+          <p:txBody>
+            <a:bodyPr spcFirstLastPara="1" wrap="square" lIns="91425" tIns="91425" rIns="91425" bIns="91425" anchor="ctr" anchorCtr="0">
+              <a:noAutofit/>
+            </a:bodyPr>
+            <a:lstStyle/>
+            <a:p>
+              <a:pPr marL="0" lvl="0" indent="0" algn="l" rtl="0">
+                <a:spcBef>
+                  <a:spcPts val="0"/>
+                </a:spcBef>
+                <a:spcAft>
+                  <a:spcPts val="0"/>
+                </a:spcAft>
+                <a:buNone/>
+              </a:pPr>
+              <a:endParaRPr/>
+            </a:p>
+          </p:txBody>
+        </p:sp>
+        <p:cxnSp>
+          <p:nvCxnSpPr>
+            <p:cNvPr id="15" name="Google Shape;168;p16">
+              <a:extLst>
+                <a:ext uri="{FF2B5EF4-FFF2-40B4-BE49-F238E27FC236}">
+                  <a16:creationId xmlns:a16="http://schemas.microsoft.com/office/drawing/2014/main" id="{60D62F18-63A0-498B-B7B6-3B5BD0A22DDC}"/>
+                </a:ext>
+              </a:extLst>
+            </p:cNvPr>
+            <p:cNvCxnSpPr/>
+            <p:nvPr/>
+          </p:nvCxnSpPr>
+          <p:spPr>
+            <a:xfrm rot="10800000">
+              <a:off x="4691940" y="4570200"/>
+              <a:ext cx="403500" cy="0"/>
+            </a:xfrm>
+            <a:prstGeom prst="straightConnector1">
+              <a:avLst/>
+            </a:prstGeom>
+            <a:noFill/>
+            <a:ln w="29150" cap="flat" cmpd="sng">
+              <a:solidFill>
+                <a:srgbClr val="000000"/>
+              </a:solidFill>
+              <a:prstDash val="solid"/>
+              <a:round/>
+              <a:headEnd type="none" w="sm" len="sm"/>
+              <a:tailEnd type="none" w="sm" len="sm"/>
+            </a:ln>
+          </p:spPr>
+        </p:cxnSp>
+      </p:grpSp>
+      <p:cxnSp>
+        <p:nvCxnSpPr>
+          <p:cNvPr id="25" name="Google Shape;75;p15">
+            <a:extLst>
+              <a:ext uri="{FF2B5EF4-FFF2-40B4-BE49-F238E27FC236}">
+                <a16:creationId xmlns:a16="http://schemas.microsoft.com/office/drawing/2014/main" id="{26708BC3-1D31-433A-BD48-3A34E3B39279}"/>
+              </a:ext>
+            </a:extLst>
+          </p:cNvPr>
+          <p:cNvCxnSpPr/>
+          <p:nvPr/>
+        </p:nvCxnSpPr>
+        <p:spPr>
+          <a:xfrm rot="10800000" flipH="1">
+            <a:off x="2059793" y="704233"/>
+            <a:ext cx="934200" cy="922200"/>
+          </a:xfrm>
+          <a:prstGeom prst="bentConnector3">
+            <a:avLst>
+              <a:gd name="adj1" fmla="val 50000"/>
+            </a:avLst>
+          </a:prstGeom>
+          <a:noFill/>
+          <a:ln w="29150" cap="flat" cmpd="sng">
+            <a:solidFill>
+              <a:srgbClr val="000000"/>
+            </a:solidFill>
+            <a:prstDash val="dash"/>
+            <a:round/>
+            <a:headEnd type="none" w="sm" len="sm"/>
+            <a:tailEnd type="triangle" w="med" len="med"/>
+          </a:ln>
+        </p:spPr>
+      </p:cxnSp>
+      <p:sp>
+        <p:nvSpPr>
+          <p:cNvPr id="27" name="Google Shape;71;p15">
+            <a:extLst>
+              <a:ext uri="{FF2B5EF4-FFF2-40B4-BE49-F238E27FC236}">
+                <a16:creationId xmlns:a16="http://schemas.microsoft.com/office/drawing/2014/main" id="{43597C4C-C702-4C6A-821E-6EEFA8657C0A}"/>
+              </a:ext>
+            </a:extLst>
+          </p:cNvPr>
+          <p:cNvSpPr txBox="1"/>
+          <p:nvPr/>
+        </p:nvSpPr>
+        <p:spPr>
+          <a:xfrm>
+            <a:off x="6174660" y="564998"/>
+            <a:ext cx="1182391" cy="496782"/>
+          </a:xfrm>
+          <a:prstGeom prst="rect">
+            <a:avLst/>
+          </a:prstGeom>
+          <a:noFill/>
+          <a:ln>
+            <a:noFill/>
+          </a:ln>
+        </p:spPr>
+        <p:txBody>
+          <a:bodyPr spcFirstLastPara="1" wrap="square" lIns="81625" tIns="40825" rIns="81625" bIns="40825" anchor="t" anchorCtr="0">
+            <a:noAutofit/>
+          </a:bodyPr>
+          <a:lstStyle/>
+          <a:p>
+            <a:pPr marL="0" marR="0" lvl="0" indent="0" algn="r" rtl="0">
+              <a:spcBef>
+                <a:spcPts val="0"/>
+              </a:spcBef>
+              <a:spcAft>
+                <a:spcPts val="0"/>
+              </a:spcAft>
+              <a:buNone/>
+            </a:pPr>
+            <a:r>
+              <a:rPr lang="en" sz="900" b="0" i="0" u="none" strike="noStrike" cap="none" dirty="0">
+                <a:latin typeface="Verdana"/>
+                <a:ea typeface="Verdana"/>
+                <a:cs typeface="Verdana"/>
+                <a:sym typeface="Verdana"/>
+              </a:rPr>
+              <a:t>Verificar histório pedido cliente e rating </a:t>
+            </a:r>
+            <a:endParaRPr sz="900" b="0" strike="noStrike" dirty="0">
+              <a:latin typeface="Arial"/>
+              <a:ea typeface="Arial"/>
+              <a:cs typeface="Arial"/>
+              <a:sym typeface="Arial"/>
+            </a:endParaRPr>
+          </a:p>
+        </p:txBody>
+      </p:sp>
+      <p:sp>
+        <p:nvSpPr>
+          <p:cNvPr id="29" name="Google Shape;63;p15">
+            <a:extLst>
+              <a:ext uri="{FF2B5EF4-FFF2-40B4-BE49-F238E27FC236}">
+                <a16:creationId xmlns:a16="http://schemas.microsoft.com/office/drawing/2014/main" id="{3156886F-040A-4A49-A3BC-C74979F74719}"/>
+              </a:ext>
+            </a:extLst>
+          </p:cNvPr>
+          <p:cNvSpPr/>
+          <p:nvPr/>
+        </p:nvSpPr>
+        <p:spPr>
+          <a:xfrm>
+            <a:off x="7364961" y="760149"/>
+            <a:ext cx="1272000" cy="1110300"/>
+          </a:xfrm>
+          <a:prstGeom prst="rect">
+            <a:avLst/>
+          </a:prstGeom>
+          <a:solidFill>
+            <a:srgbClr val="FFFFFF"/>
+          </a:solidFill>
+          <a:ln w="29150" cap="flat" cmpd="sng">
+            <a:solidFill>
+              <a:srgbClr val="000000"/>
+            </a:solidFill>
+            <a:prstDash val="solid"/>
+            <a:round/>
+            <a:headEnd type="none" w="sm" len="sm"/>
+            <a:tailEnd type="none" w="sm" len="sm"/>
+          </a:ln>
+        </p:spPr>
+        <p:txBody>
+          <a:bodyPr spcFirstLastPara="1" wrap="square" lIns="94700" tIns="53875" rIns="94700" bIns="53875" anchor="ctr" anchorCtr="0">
+            <a:noAutofit/>
+          </a:bodyPr>
+          <a:lstStyle/>
+          <a:p>
+            <a:pPr marL="0" marR="0" lvl="0" indent="0" algn="ctr" rtl="0">
+              <a:spcBef>
+                <a:spcPts val="0"/>
+              </a:spcBef>
+              <a:spcAft>
+                <a:spcPts val="0"/>
+              </a:spcAft>
+              <a:buNone/>
+            </a:pPr>
+            <a:r>
+              <a:rPr lang="en" sz="1000" b="0" i="0" u="none" strike="noStrike" cap="none" dirty="0">
+                <a:solidFill>
+                  <a:srgbClr val="666666"/>
+                </a:solidFill>
+                <a:latin typeface="Verdana"/>
+                <a:ea typeface="Verdana"/>
+                <a:cs typeface="Verdana"/>
+                <a:sym typeface="Verdana"/>
+              </a:rPr>
+              <a:t>«component»</a:t>
+            </a:r>
+            <a:endParaRPr sz="1000" b="0" i="0" u="none" strike="noStrike" cap="none" dirty="0">
+              <a:latin typeface="Arial"/>
+              <a:ea typeface="Arial"/>
+              <a:cs typeface="Arial"/>
+              <a:sym typeface="Arial"/>
+            </a:endParaRPr>
+          </a:p>
+          <a:p>
+            <a:pPr marL="0" marR="0" lvl="0" indent="0" algn="ctr" rtl="0">
+              <a:spcBef>
+                <a:spcPts val="0"/>
+              </a:spcBef>
+              <a:spcAft>
+                <a:spcPts val="0"/>
+              </a:spcAft>
+              <a:buNone/>
+            </a:pPr>
+            <a:endParaRPr sz="1000" b="0" i="0" u="none" strike="noStrike" cap="none" dirty="0">
+              <a:latin typeface="Arial"/>
+              <a:ea typeface="Arial"/>
+              <a:cs typeface="Arial"/>
+              <a:sym typeface="Arial"/>
+            </a:endParaRPr>
+          </a:p>
+          <a:p>
+            <a:pPr marL="0" marR="0" lvl="0" indent="0" algn="ctr" rtl="0">
+              <a:spcBef>
+                <a:spcPts val="0"/>
+              </a:spcBef>
+              <a:spcAft>
+                <a:spcPts val="0"/>
+              </a:spcAft>
+              <a:buNone/>
+            </a:pPr>
+            <a:r>
+              <a:rPr lang="en" sz="1200" b="1" i="0" u="none" strike="noStrike" cap="none" dirty="0">
+                <a:latin typeface="Verdana"/>
+                <a:ea typeface="Verdana"/>
+                <a:cs typeface="Verdana"/>
+                <a:sym typeface="Verdana"/>
+              </a:rPr>
+              <a:t>Histórico Pedido</a:t>
+            </a:r>
+            <a:endParaRPr sz="1200" b="0" i="0" u="none" strike="noStrike" cap="none" dirty="0">
+              <a:latin typeface="Arial"/>
+              <a:ea typeface="Arial"/>
+              <a:cs typeface="Arial"/>
+              <a:sym typeface="Arial"/>
+            </a:endParaRPr>
+          </a:p>
+        </p:txBody>
+      </p:sp>
+      <p:grpSp>
+        <p:nvGrpSpPr>
+          <p:cNvPr id="30" name="Google Shape;166;p16">
+            <a:extLst>
+              <a:ext uri="{FF2B5EF4-FFF2-40B4-BE49-F238E27FC236}">
+                <a16:creationId xmlns:a16="http://schemas.microsoft.com/office/drawing/2014/main" id="{8C6F07A2-55C7-4634-832F-C3CE109A37E4}"/>
+              </a:ext>
+            </a:extLst>
+          </p:cNvPr>
+          <p:cNvGrpSpPr/>
+          <p:nvPr/>
+        </p:nvGrpSpPr>
+        <p:grpSpPr>
+          <a:xfrm>
+            <a:off x="6853000" y="1089986"/>
+            <a:ext cx="521115" cy="225313"/>
+            <a:chOff x="4470180" y="4459680"/>
+            <a:chExt cx="625260" cy="221700"/>
+          </a:xfrm>
+        </p:grpSpPr>
+        <p:sp>
+          <p:nvSpPr>
+            <p:cNvPr id="31" name="Google Shape;167;p16">
+              <a:extLst>
+                <a:ext uri="{FF2B5EF4-FFF2-40B4-BE49-F238E27FC236}">
+                  <a16:creationId xmlns:a16="http://schemas.microsoft.com/office/drawing/2014/main" id="{A42ECAA7-5D1F-4780-91A7-A3A65B30AA66}"/>
+                </a:ext>
+              </a:extLst>
+            </p:cNvPr>
+            <p:cNvSpPr/>
+            <p:nvPr/>
+          </p:nvSpPr>
+          <p:spPr>
+            <a:xfrm flipH="1">
+              <a:off x="4470180" y="4459680"/>
+              <a:ext cx="221700" cy="221700"/>
+            </a:xfrm>
+            <a:prstGeom prst="ellipse">
+              <a:avLst/>
+            </a:prstGeom>
+            <a:solidFill>
+              <a:srgbClr val="FFFFFF"/>
+            </a:solidFill>
+            <a:ln w="29150" cap="flat" cmpd="sng">
+              <a:solidFill>
+                <a:srgbClr val="000000"/>
+              </a:solidFill>
+              <a:prstDash val="solid"/>
+              <a:round/>
+              <a:headEnd type="none" w="sm" len="sm"/>
+              <a:tailEnd type="none" w="sm" len="sm"/>
+            </a:ln>
+          </p:spPr>
+          <p:txBody>
+            <a:bodyPr spcFirstLastPara="1" wrap="square" lIns="91425" tIns="91425" rIns="91425" bIns="91425" anchor="ctr" anchorCtr="0">
+              <a:noAutofit/>
+            </a:bodyPr>
+            <a:lstStyle/>
+            <a:p>
+              <a:pPr marL="0" lvl="0" indent="0" algn="l" rtl="0">
+                <a:spcBef>
+                  <a:spcPts val="0"/>
+                </a:spcBef>
+                <a:spcAft>
+                  <a:spcPts val="0"/>
+                </a:spcAft>
+                <a:buNone/>
+              </a:pPr>
+              <a:endParaRPr/>
+            </a:p>
+          </p:txBody>
+        </p:sp>
+        <p:cxnSp>
+          <p:nvCxnSpPr>
+            <p:cNvPr id="32" name="Google Shape;168;p16">
+              <a:extLst>
+                <a:ext uri="{FF2B5EF4-FFF2-40B4-BE49-F238E27FC236}">
+                  <a16:creationId xmlns:a16="http://schemas.microsoft.com/office/drawing/2014/main" id="{88BCF39D-B35E-4056-A60F-A466A35A26D1}"/>
+                </a:ext>
+              </a:extLst>
+            </p:cNvPr>
+            <p:cNvCxnSpPr/>
+            <p:nvPr/>
+          </p:nvCxnSpPr>
+          <p:spPr>
+            <a:xfrm rot="10800000">
+              <a:off x="4691940" y="4570200"/>
+              <a:ext cx="403500" cy="0"/>
+            </a:xfrm>
+            <a:prstGeom prst="straightConnector1">
+              <a:avLst/>
+            </a:prstGeom>
+            <a:noFill/>
+            <a:ln w="29150" cap="flat" cmpd="sng">
+              <a:solidFill>
+                <a:srgbClr val="000000"/>
+              </a:solidFill>
+              <a:prstDash val="solid"/>
+              <a:round/>
+              <a:headEnd type="none" w="sm" len="sm"/>
+              <a:tailEnd type="none" w="sm" len="sm"/>
+            </a:ln>
+          </p:spPr>
+        </p:cxnSp>
+      </p:grpSp>
+      <p:grpSp>
+        <p:nvGrpSpPr>
+          <p:cNvPr id="33" name="Google Shape;166;p16">
+            <a:extLst>
+              <a:ext uri="{FF2B5EF4-FFF2-40B4-BE49-F238E27FC236}">
+                <a16:creationId xmlns:a16="http://schemas.microsoft.com/office/drawing/2014/main" id="{4B89E86E-869B-4273-8211-C520C54C7D14}"/>
+              </a:ext>
+            </a:extLst>
+          </p:cNvPr>
+          <p:cNvGrpSpPr/>
+          <p:nvPr/>
+        </p:nvGrpSpPr>
+        <p:grpSpPr>
+          <a:xfrm>
+            <a:off x="6842297" y="1496438"/>
+            <a:ext cx="521115" cy="225313"/>
+            <a:chOff x="4470180" y="4459680"/>
+            <a:chExt cx="625260" cy="221700"/>
+          </a:xfrm>
+        </p:grpSpPr>
+        <p:sp>
+          <p:nvSpPr>
+            <p:cNvPr id="34" name="Google Shape;167;p16">
+              <a:extLst>
+                <a:ext uri="{FF2B5EF4-FFF2-40B4-BE49-F238E27FC236}">
+                  <a16:creationId xmlns:a16="http://schemas.microsoft.com/office/drawing/2014/main" id="{9BA2ABA0-AE2B-4036-B996-60E633CFE5F4}"/>
+                </a:ext>
+              </a:extLst>
+            </p:cNvPr>
+            <p:cNvSpPr/>
+            <p:nvPr/>
+          </p:nvSpPr>
+          <p:spPr>
+            <a:xfrm flipH="1">
+              <a:off x="4470180" y="4459680"/>
+              <a:ext cx="221700" cy="221700"/>
+            </a:xfrm>
+            <a:prstGeom prst="ellipse">
+              <a:avLst/>
+            </a:prstGeom>
+            <a:solidFill>
+              <a:srgbClr val="FFFFFF"/>
+            </a:solidFill>
+            <a:ln w="29150" cap="flat" cmpd="sng">
+              <a:solidFill>
+                <a:srgbClr val="000000"/>
+              </a:solidFill>
+              <a:prstDash val="solid"/>
+              <a:round/>
+              <a:headEnd type="none" w="sm" len="sm"/>
+              <a:tailEnd type="none" w="sm" len="sm"/>
+            </a:ln>
+          </p:spPr>
+          <p:txBody>
+            <a:bodyPr spcFirstLastPara="1" wrap="square" lIns="91425" tIns="91425" rIns="91425" bIns="91425" anchor="ctr" anchorCtr="0">
+              <a:noAutofit/>
+            </a:bodyPr>
+            <a:lstStyle/>
+            <a:p>
+              <a:pPr marL="0" lvl="0" indent="0" algn="l" rtl="0">
+                <a:spcBef>
+                  <a:spcPts val="0"/>
+                </a:spcBef>
+                <a:spcAft>
+                  <a:spcPts val="0"/>
+                </a:spcAft>
+                <a:buNone/>
+              </a:pPr>
+              <a:endParaRPr/>
+            </a:p>
+          </p:txBody>
+        </p:sp>
+        <p:cxnSp>
+          <p:nvCxnSpPr>
+            <p:cNvPr id="35" name="Google Shape;168;p16">
+              <a:extLst>
+                <a:ext uri="{FF2B5EF4-FFF2-40B4-BE49-F238E27FC236}">
+                  <a16:creationId xmlns:a16="http://schemas.microsoft.com/office/drawing/2014/main" id="{F1E72557-764D-48FB-A520-FCC2A8545A9A}"/>
+                </a:ext>
+              </a:extLst>
+            </p:cNvPr>
+            <p:cNvCxnSpPr/>
+            <p:nvPr/>
+          </p:nvCxnSpPr>
+          <p:spPr>
+            <a:xfrm rot="10800000">
+              <a:off x="4691940" y="4570200"/>
+              <a:ext cx="403500" cy="0"/>
+            </a:xfrm>
+            <a:prstGeom prst="straightConnector1">
+              <a:avLst/>
+            </a:prstGeom>
+            <a:noFill/>
+            <a:ln w="29150" cap="flat" cmpd="sng">
+              <a:solidFill>
+                <a:srgbClr val="000000"/>
+              </a:solidFill>
+              <a:prstDash val="solid"/>
+              <a:round/>
+              <a:headEnd type="none" w="sm" len="sm"/>
+              <a:tailEnd type="none" w="sm" len="sm"/>
+            </a:ln>
+          </p:spPr>
+        </p:cxnSp>
+      </p:grpSp>
+      <p:sp>
+        <p:nvSpPr>
+          <p:cNvPr id="36" name="Google Shape;91;p15">
+            <a:extLst>
+              <a:ext uri="{FF2B5EF4-FFF2-40B4-BE49-F238E27FC236}">
+                <a16:creationId xmlns:a16="http://schemas.microsoft.com/office/drawing/2014/main" id="{0A37B4CE-E4E9-445F-9E70-683AA513E6FF}"/>
+              </a:ext>
+            </a:extLst>
+          </p:cNvPr>
+          <p:cNvSpPr/>
+          <p:nvPr/>
+        </p:nvSpPr>
+        <p:spPr>
+          <a:xfrm>
+            <a:off x="5535697" y="299279"/>
+            <a:ext cx="115599" cy="225313"/>
+          </a:xfrm>
+          <a:custGeom>
+            <a:avLst/>
+            <a:gdLst/>
+            <a:ahLst/>
+            <a:cxnLst/>
+            <a:rect l="l" t="t" r="r" b="b"/>
+            <a:pathLst>
+              <a:path w="354" h="690" extrusionOk="0">
+                <a:moveTo>
+                  <a:pt x="352" y="0"/>
+                </a:moveTo>
+                <a:cubicBezTo>
+                  <a:pt x="351" y="0"/>
+                  <a:pt x="351" y="0"/>
+                  <a:pt x="350" y="1"/>
+                </a:cubicBezTo>
+                <a:cubicBezTo>
+                  <a:pt x="350" y="1"/>
+                  <a:pt x="349" y="1"/>
+                  <a:pt x="349" y="2"/>
+                </a:cubicBezTo>
+                <a:cubicBezTo>
+                  <a:pt x="348" y="3"/>
+                  <a:pt x="348" y="3"/>
+                  <a:pt x="348" y="4"/>
+                </a:cubicBezTo>
+                <a:lnTo>
+                  <a:pt x="348" y="8"/>
+                </a:lnTo>
+                <a:cubicBezTo>
+                  <a:pt x="347" y="8"/>
+                  <a:pt x="346" y="8"/>
+                  <a:pt x="345" y="8"/>
+                </a:cubicBezTo>
+                <a:cubicBezTo>
+                  <a:pt x="298" y="8"/>
+                  <a:pt x="252" y="17"/>
+                  <a:pt x="211" y="33"/>
+                </a:cubicBezTo>
+                <a:cubicBezTo>
+                  <a:pt x="171" y="50"/>
+                  <a:pt x="135" y="75"/>
+                  <a:pt x="104" y="104"/>
+                </a:cubicBezTo>
+                <a:cubicBezTo>
+                  <a:pt x="75" y="135"/>
+                  <a:pt x="50" y="171"/>
+                  <a:pt x="33" y="211"/>
+                </a:cubicBezTo>
+                <a:cubicBezTo>
+                  <a:pt x="17" y="252"/>
+                  <a:pt x="8" y="298"/>
+                  <a:pt x="8" y="345"/>
+                </a:cubicBezTo>
+                <a:cubicBezTo>
+                  <a:pt x="8" y="392"/>
+                  <a:pt x="17" y="437"/>
+                  <a:pt x="33" y="478"/>
+                </a:cubicBezTo>
+                <a:cubicBezTo>
+                  <a:pt x="50" y="519"/>
+                  <a:pt x="75" y="555"/>
+                  <a:pt x="104" y="585"/>
+                </a:cubicBezTo>
+                <a:cubicBezTo>
+                  <a:pt x="135" y="615"/>
+                  <a:pt x="171" y="640"/>
+                  <a:pt x="211" y="656"/>
+                </a:cubicBezTo>
+                <a:cubicBezTo>
+                  <a:pt x="252" y="673"/>
+                  <a:pt x="298" y="683"/>
+                  <a:pt x="345" y="683"/>
+                </a:cubicBezTo>
+                <a:cubicBezTo>
+                  <a:pt x="346" y="683"/>
+                  <a:pt x="347" y="683"/>
+                  <a:pt x="348" y="683"/>
+                </a:cubicBezTo>
+                <a:lnTo>
+                  <a:pt x="348" y="689"/>
+                </a:lnTo>
+                <a:cubicBezTo>
+                  <a:pt x="347" y="689"/>
+                  <a:pt x="346" y="689"/>
+                  <a:pt x="345" y="689"/>
+                </a:cubicBezTo>
+                <a:cubicBezTo>
+                  <a:pt x="296" y="689"/>
+                  <a:pt x="250" y="680"/>
+                  <a:pt x="208" y="663"/>
+                </a:cubicBezTo>
+                <a:cubicBezTo>
+                  <a:pt x="167" y="646"/>
+                  <a:pt x="130" y="621"/>
+                  <a:pt x="99" y="590"/>
+                </a:cubicBezTo>
+                <a:cubicBezTo>
+                  <a:pt x="68" y="559"/>
+                  <a:pt x="43" y="522"/>
+                  <a:pt x="27" y="481"/>
+                </a:cubicBezTo>
+                <a:cubicBezTo>
+                  <a:pt x="10" y="439"/>
+                  <a:pt x="0" y="393"/>
+                  <a:pt x="0" y="345"/>
+                </a:cubicBezTo>
+                <a:cubicBezTo>
+                  <a:pt x="0" y="296"/>
+                  <a:pt x="10" y="250"/>
+                  <a:pt x="27" y="208"/>
+                </a:cubicBezTo>
+                <a:cubicBezTo>
+                  <a:pt x="43" y="167"/>
+                  <a:pt x="68" y="130"/>
+                  <a:pt x="99" y="99"/>
+                </a:cubicBezTo>
+                <a:cubicBezTo>
+                  <a:pt x="130" y="68"/>
+                  <a:pt x="167" y="43"/>
+                  <a:pt x="208" y="27"/>
+                </a:cubicBezTo>
+                <a:cubicBezTo>
+                  <a:pt x="250" y="10"/>
+                  <a:pt x="296" y="0"/>
+                  <a:pt x="345" y="0"/>
+                </a:cubicBezTo>
+                <a:cubicBezTo>
+                  <a:pt x="347" y="0"/>
+                  <a:pt x="350" y="0"/>
+                  <a:pt x="353" y="0"/>
+                </a:cubicBezTo>
+                <a:lnTo>
+                  <a:pt x="352" y="0"/>
+                </a:lnTo>
+              </a:path>
+            </a:pathLst>
+          </a:custGeom>
+          <a:solidFill>
+            <a:srgbClr val="000000"/>
+          </a:solidFill>
+          <a:ln w="29150" cap="flat" cmpd="sng">
+            <a:solidFill>
+              <a:srgbClr val="000000"/>
+            </a:solidFill>
+            <a:prstDash val="solid"/>
+            <a:round/>
+            <a:headEnd type="none" w="sm" len="sm"/>
+            <a:tailEnd type="none" w="sm" len="sm"/>
+          </a:ln>
+        </p:spPr>
+        <p:txBody>
+          <a:bodyPr spcFirstLastPara="1" wrap="square" lIns="82925" tIns="82925" rIns="82925" bIns="82925" anchor="ctr" anchorCtr="0">
+            <a:noAutofit/>
+          </a:bodyPr>
+          <a:lstStyle/>
+          <a:p>
+            <a:pPr marL="0" lvl="0" indent="0" algn="l" rtl="0">
+              <a:spcBef>
+                <a:spcPts val="0"/>
+              </a:spcBef>
+              <a:spcAft>
+                <a:spcPts val="0"/>
+              </a:spcAft>
+              <a:buNone/>
+            </a:pPr>
+            <a:endParaRPr/>
+          </a:p>
+        </p:txBody>
+      </p:sp>
+      <p:cxnSp>
+        <p:nvCxnSpPr>
+          <p:cNvPr id="37" name="Google Shape;92;p15">
+            <a:extLst>
+              <a:ext uri="{FF2B5EF4-FFF2-40B4-BE49-F238E27FC236}">
+                <a16:creationId xmlns:a16="http://schemas.microsoft.com/office/drawing/2014/main" id="{C70EB905-D112-4B7D-84F1-F3FA767EF563}"/>
+              </a:ext>
+            </a:extLst>
+          </p:cNvPr>
+          <p:cNvCxnSpPr>
+            <a:cxnSpLocks/>
+          </p:cNvCxnSpPr>
+          <p:nvPr/>
+        </p:nvCxnSpPr>
+        <p:spPr>
+          <a:xfrm>
+            <a:off x="5307097" y="421464"/>
+            <a:ext cx="228600" cy="0"/>
+          </a:xfrm>
+          <a:prstGeom prst="straightConnector1">
+            <a:avLst/>
+          </a:prstGeom>
+          <a:noFill/>
+          <a:ln w="29150" cap="flat" cmpd="sng">
+            <a:solidFill>
+              <a:srgbClr val="000000"/>
+            </a:solidFill>
+            <a:prstDash val="solid"/>
+            <a:round/>
+            <a:headEnd type="none" w="sm" len="sm"/>
+            <a:tailEnd type="none" w="sm" len="sm"/>
+          </a:ln>
+        </p:spPr>
+      </p:cxnSp>
+      <p:sp>
+        <p:nvSpPr>
+          <p:cNvPr id="40" name="Google Shape;91;p15">
+            <a:extLst>
+              <a:ext uri="{FF2B5EF4-FFF2-40B4-BE49-F238E27FC236}">
+                <a16:creationId xmlns:a16="http://schemas.microsoft.com/office/drawing/2014/main" id="{178F4589-8644-4D57-9AFC-E76AB62D6B83}"/>
+              </a:ext>
+            </a:extLst>
+          </p:cNvPr>
+          <p:cNvSpPr/>
+          <p:nvPr/>
+        </p:nvSpPr>
+        <p:spPr>
+          <a:xfrm>
+            <a:off x="5547100" y="756221"/>
+            <a:ext cx="115599" cy="225313"/>
+          </a:xfrm>
+          <a:custGeom>
+            <a:avLst/>
+            <a:gdLst/>
+            <a:ahLst/>
+            <a:cxnLst/>
+            <a:rect l="l" t="t" r="r" b="b"/>
+            <a:pathLst>
+              <a:path w="354" h="690" extrusionOk="0">
+                <a:moveTo>
+                  <a:pt x="352" y="0"/>
+                </a:moveTo>
+                <a:cubicBezTo>
+                  <a:pt x="351" y="0"/>
+                  <a:pt x="351" y="0"/>
+                  <a:pt x="350" y="1"/>
+                </a:cubicBezTo>
+                <a:cubicBezTo>
+                  <a:pt x="350" y="1"/>
+                  <a:pt x="349" y="1"/>
+                  <a:pt x="349" y="2"/>
+                </a:cubicBezTo>
+                <a:cubicBezTo>
+                  <a:pt x="348" y="3"/>
+                  <a:pt x="348" y="3"/>
+                  <a:pt x="348" y="4"/>
+                </a:cubicBezTo>
+                <a:lnTo>
+                  <a:pt x="348" y="8"/>
+                </a:lnTo>
+                <a:cubicBezTo>
+                  <a:pt x="347" y="8"/>
+                  <a:pt x="346" y="8"/>
+                  <a:pt x="345" y="8"/>
+                </a:cubicBezTo>
+                <a:cubicBezTo>
+                  <a:pt x="298" y="8"/>
+                  <a:pt x="252" y="17"/>
+                  <a:pt x="211" y="33"/>
+                </a:cubicBezTo>
+                <a:cubicBezTo>
+                  <a:pt x="171" y="50"/>
+                  <a:pt x="135" y="75"/>
+                  <a:pt x="104" y="104"/>
+                </a:cubicBezTo>
+                <a:cubicBezTo>
+                  <a:pt x="75" y="135"/>
+                  <a:pt x="50" y="171"/>
+                  <a:pt x="33" y="211"/>
+                </a:cubicBezTo>
+                <a:cubicBezTo>
+                  <a:pt x="17" y="252"/>
+                  <a:pt x="8" y="298"/>
+                  <a:pt x="8" y="345"/>
+                </a:cubicBezTo>
+                <a:cubicBezTo>
+                  <a:pt x="8" y="392"/>
+                  <a:pt x="17" y="437"/>
+                  <a:pt x="33" y="478"/>
+                </a:cubicBezTo>
+                <a:cubicBezTo>
+                  <a:pt x="50" y="519"/>
+                  <a:pt x="75" y="555"/>
+                  <a:pt x="104" y="585"/>
+                </a:cubicBezTo>
+                <a:cubicBezTo>
+                  <a:pt x="135" y="615"/>
+                  <a:pt x="171" y="640"/>
+                  <a:pt x="211" y="656"/>
+                </a:cubicBezTo>
+                <a:cubicBezTo>
+                  <a:pt x="252" y="673"/>
+                  <a:pt x="298" y="683"/>
+                  <a:pt x="345" y="683"/>
+                </a:cubicBezTo>
+                <a:cubicBezTo>
+                  <a:pt x="346" y="683"/>
+                  <a:pt x="347" y="683"/>
+                  <a:pt x="348" y="683"/>
+                </a:cubicBezTo>
+                <a:lnTo>
+                  <a:pt x="348" y="689"/>
+                </a:lnTo>
+                <a:cubicBezTo>
+                  <a:pt x="347" y="689"/>
+                  <a:pt x="346" y="689"/>
+                  <a:pt x="345" y="689"/>
+                </a:cubicBezTo>
+                <a:cubicBezTo>
+                  <a:pt x="296" y="689"/>
+                  <a:pt x="250" y="680"/>
+                  <a:pt x="208" y="663"/>
+                </a:cubicBezTo>
+                <a:cubicBezTo>
+                  <a:pt x="167" y="646"/>
+                  <a:pt x="130" y="621"/>
+                  <a:pt x="99" y="590"/>
+                </a:cubicBezTo>
+                <a:cubicBezTo>
+                  <a:pt x="68" y="559"/>
+                  <a:pt x="43" y="522"/>
+                  <a:pt x="27" y="481"/>
+                </a:cubicBezTo>
+                <a:cubicBezTo>
+                  <a:pt x="10" y="439"/>
+                  <a:pt x="0" y="393"/>
+                  <a:pt x="0" y="345"/>
+                </a:cubicBezTo>
+                <a:cubicBezTo>
+                  <a:pt x="0" y="296"/>
+                  <a:pt x="10" y="250"/>
+                  <a:pt x="27" y="208"/>
+                </a:cubicBezTo>
+                <a:cubicBezTo>
+                  <a:pt x="43" y="167"/>
+                  <a:pt x="68" y="130"/>
+                  <a:pt x="99" y="99"/>
+                </a:cubicBezTo>
+                <a:cubicBezTo>
+                  <a:pt x="130" y="68"/>
+                  <a:pt x="167" y="43"/>
+                  <a:pt x="208" y="27"/>
+                </a:cubicBezTo>
+                <a:cubicBezTo>
+                  <a:pt x="250" y="10"/>
+                  <a:pt x="296" y="0"/>
+                  <a:pt x="345" y="0"/>
+                </a:cubicBezTo>
+                <a:cubicBezTo>
+                  <a:pt x="347" y="0"/>
+                  <a:pt x="350" y="0"/>
+                  <a:pt x="353" y="0"/>
+                </a:cubicBezTo>
+                <a:lnTo>
+                  <a:pt x="352" y="0"/>
+                </a:lnTo>
+              </a:path>
+            </a:pathLst>
+          </a:custGeom>
+          <a:solidFill>
+            <a:srgbClr val="000000"/>
+          </a:solidFill>
+          <a:ln w="29150" cap="flat" cmpd="sng">
+            <a:solidFill>
+              <a:srgbClr val="000000"/>
+            </a:solidFill>
+            <a:prstDash val="solid"/>
+            <a:round/>
+            <a:headEnd type="none" w="sm" len="sm"/>
+            <a:tailEnd type="none" w="sm" len="sm"/>
+          </a:ln>
+        </p:spPr>
+        <p:txBody>
+          <a:bodyPr spcFirstLastPara="1" wrap="square" lIns="82925" tIns="82925" rIns="82925" bIns="82925" anchor="ctr" anchorCtr="0">
+            <a:noAutofit/>
+          </a:bodyPr>
+          <a:lstStyle/>
+          <a:p>
+            <a:pPr marL="0" lvl="0" indent="0" algn="l" rtl="0">
+              <a:spcBef>
+                <a:spcPts val="0"/>
+              </a:spcBef>
+              <a:spcAft>
+                <a:spcPts val="0"/>
+              </a:spcAft>
+              <a:buNone/>
+            </a:pPr>
+            <a:endParaRPr/>
+          </a:p>
+        </p:txBody>
+      </p:sp>
+      <p:cxnSp>
+        <p:nvCxnSpPr>
+          <p:cNvPr id="41" name="Google Shape;92;p15">
+            <a:extLst>
+              <a:ext uri="{FF2B5EF4-FFF2-40B4-BE49-F238E27FC236}">
+                <a16:creationId xmlns:a16="http://schemas.microsoft.com/office/drawing/2014/main" id="{88CB0CF0-B45B-4ED9-813C-A0C782D2633E}"/>
+              </a:ext>
+            </a:extLst>
+          </p:cNvPr>
+          <p:cNvCxnSpPr>
+            <a:cxnSpLocks/>
+          </p:cNvCxnSpPr>
+          <p:nvPr/>
+        </p:nvCxnSpPr>
+        <p:spPr>
+          <a:xfrm>
+            <a:off x="5326410" y="872805"/>
+            <a:ext cx="228600" cy="0"/>
+          </a:xfrm>
+          <a:prstGeom prst="straightConnector1">
+            <a:avLst/>
+          </a:prstGeom>
+          <a:noFill/>
+          <a:ln w="29150" cap="flat" cmpd="sng">
+            <a:solidFill>
+              <a:srgbClr val="000000"/>
+            </a:solidFill>
+            <a:prstDash val="solid"/>
+            <a:round/>
+            <a:headEnd type="none" w="sm" len="sm"/>
+            <a:tailEnd type="none" w="sm" len="sm"/>
+          </a:ln>
+        </p:spPr>
+      </p:cxnSp>
+      <p:cxnSp>
+        <p:nvCxnSpPr>
+          <p:cNvPr id="44" name="Google Shape;75;p15">
+            <a:extLst>
+              <a:ext uri="{FF2B5EF4-FFF2-40B4-BE49-F238E27FC236}">
+                <a16:creationId xmlns:a16="http://schemas.microsoft.com/office/drawing/2014/main" id="{6DE40811-EA43-409D-9C31-547D7627EC00}"/>
+              </a:ext>
+            </a:extLst>
+          </p:cNvPr>
+          <p:cNvCxnSpPr>
+            <a:cxnSpLocks/>
+            <a:endCxn id="31" idx="6"/>
+          </p:cNvCxnSpPr>
+          <p:nvPr/>
+        </p:nvCxnSpPr>
+        <p:spPr>
+          <a:xfrm>
+            <a:off x="5670610" y="421463"/>
+            <a:ext cx="1182390" cy="781180"/>
+          </a:xfrm>
+          <a:prstGeom prst="bentConnector3">
+            <a:avLst>
+              <a:gd name="adj1" fmla="val 50000"/>
+            </a:avLst>
+          </a:prstGeom>
+          <a:noFill/>
+          <a:ln w="29150" cap="flat" cmpd="sng">
+            <a:solidFill>
+              <a:srgbClr val="000000"/>
+            </a:solidFill>
+            <a:prstDash val="dash"/>
+            <a:round/>
+            <a:headEnd type="none" w="sm" len="sm"/>
+            <a:tailEnd type="triangle" w="med" len="med"/>
+          </a:ln>
+        </p:spPr>
+      </p:cxnSp>
+      <p:cxnSp>
+        <p:nvCxnSpPr>
+          <p:cNvPr id="47" name="Google Shape;75;p15">
+            <a:extLst>
+              <a:ext uri="{FF2B5EF4-FFF2-40B4-BE49-F238E27FC236}">
+                <a16:creationId xmlns:a16="http://schemas.microsoft.com/office/drawing/2014/main" id="{4F377E4B-3FAB-4F58-9904-AEB53C11F4C0}"/>
+              </a:ext>
+            </a:extLst>
+          </p:cNvPr>
+          <p:cNvCxnSpPr>
+            <a:cxnSpLocks/>
+          </p:cNvCxnSpPr>
+          <p:nvPr/>
+        </p:nvCxnSpPr>
+        <p:spPr>
+          <a:xfrm>
+            <a:off x="5599453" y="832861"/>
+            <a:ext cx="1182390" cy="781180"/>
+          </a:xfrm>
+          <a:prstGeom prst="bentConnector3">
+            <a:avLst>
+              <a:gd name="adj1" fmla="val 50000"/>
+            </a:avLst>
+          </a:prstGeom>
+          <a:noFill/>
+          <a:ln w="29150" cap="flat" cmpd="sng">
+            <a:solidFill>
+              <a:srgbClr val="000000"/>
+            </a:solidFill>
+            <a:prstDash val="dash"/>
+            <a:round/>
+            <a:headEnd type="none" w="sm" len="sm"/>
+            <a:tailEnd type="triangle" w="med" len="med"/>
+          </a:ln>
+        </p:spPr>
+      </p:cxnSp>
+      <p:sp>
+        <p:nvSpPr>
+          <p:cNvPr id="50" name="Google Shape;71;p15">
+            <a:extLst>
+              <a:ext uri="{FF2B5EF4-FFF2-40B4-BE49-F238E27FC236}">
+                <a16:creationId xmlns:a16="http://schemas.microsoft.com/office/drawing/2014/main" id="{819839A7-2844-4F1B-87EF-4448AEE8F27A}"/>
+              </a:ext>
+            </a:extLst>
+          </p:cNvPr>
+          <p:cNvSpPr txBox="1"/>
+          <p:nvPr/>
+        </p:nvSpPr>
+        <p:spPr>
+          <a:xfrm>
+            <a:off x="1287256" y="329565"/>
+            <a:ext cx="1615928" cy="496782"/>
+          </a:xfrm>
+          <a:prstGeom prst="rect">
+            <a:avLst/>
+          </a:prstGeom>
+          <a:noFill/>
+          <a:ln>
+            <a:noFill/>
+          </a:ln>
+        </p:spPr>
+        <p:txBody>
+          <a:bodyPr spcFirstLastPara="1" wrap="square" lIns="81625" tIns="40825" rIns="81625" bIns="40825" anchor="t" anchorCtr="0">
+            <a:noAutofit/>
+          </a:bodyPr>
+          <a:lstStyle/>
+          <a:p>
+            <a:pPr marL="0" marR="0" lvl="0" indent="0" algn="r" rtl="0">
+              <a:spcBef>
+                <a:spcPts val="0"/>
+              </a:spcBef>
+              <a:spcAft>
+                <a:spcPts val="0"/>
+              </a:spcAft>
+              <a:buNone/>
+            </a:pPr>
+            <a:r>
+              <a:rPr lang="en" sz="900" b="0" i="0" u="none" strike="noStrike" cap="none" dirty="0">
+                <a:latin typeface="Verdana"/>
+                <a:ea typeface="Verdana"/>
+                <a:cs typeface="Verdana"/>
+                <a:sym typeface="Verdana"/>
+              </a:rPr>
+              <a:t>Verificar Recomendações </a:t>
+            </a:r>
+            <a:endParaRPr sz="900" b="0" strike="noStrike" dirty="0">
+              <a:latin typeface="Arial"/>
+              <a:ea typeface="Arial"/>
+              <a:cs typeface="Arial"/>
+              <a:sym typeface="Arial"/>
+            </a:endParaRPr>
+          </a:p>
+        </p:txBody>
+      </p:sp>
+      <p:sp>
+        <p:nvSpPr>
+          <p:cNvPr id="51" name="Google Shape;77;p15">
+            <a:extLst>
+              <a:ext uri="{FF2B5EF4-FFF2-40B4-BE49-F238E27FC236}">
+                <a16:creationId xmlns:a16="http://schemas.microsoft.com/office/drawing/2014/main" id="{35250F5F-7295-4CAF-9847-FD32262FF25C}"/>
+              </a:ext>
+            </a:extLst>
+          </p:cNvPr>
+          <p:cNvSpPr txBox="1"/>
+          <p:nvPr/>
+        </p:nvSpPr>
+        <p:spPr>
+          <a:xfrm>
+            <a:off x="6066269" y="1699004"/>
+            <a:ext cx="1139700" cy="225300"/>
+          </a:xfrm>
+          <a:prstGeom prst="rect">
+            <a:avLst/>
+          </a:prstGeom>
+          <a:noFill/>
+          <a:ln>
+            <a:noFill/>
+          </a:ln>
+        </p:spPr>
+        <p:txBody>
+          <a:bodyPr spcFirstLastPara="1" wrap="square" lIns="81625" tIns="40825" rIns="81625" bIns="40825" anchor="t" anchorCtr="0">
+            <a:noAutofit/>
+          </a:bodyPr>
+          <a:lstStyle/>
+          <a:p>
+            <a:pPr marL="0" marR="0" lvl="0" indent="0" algn="r" rtl="0">
+              <a:spcBef>
+                <a:spcPts val="0"/>
+              </a:spcBef>
+              <a:spcAft>
+                <a:spcPts val="0"/>
+              </a:spcAft>
+              <a:buNone/>
+            </a:pPr>
+            <a:r>
+              <a:rPr lang="en" sz="900" b="0" strike="noStrike" dirty="0">
+                <a:latin typeface="Verdana"/>
+                <a:ea typeface="Verdana"/>
+                <a:cs typeface="Verdana"/>
+                <a:sym typeface="Verdana"/>
+              </a:rPr>
+              <a:t>Verificar histórico pedidos e rating</a:t>
+            </a:r>
+            <a:endParaRPr sz="900" b="0" strike="noStrike" dirty="0">
+              <a:latin typeface="Arial"/>
+              <a:ea typeface="Arial"/>
+              <a:cs typeface="Arial"/>
+              <a:sym typeface="Arial"/>
+            </a:endParaRPr>
+          </a:p>
+        </p:txBody>
+      </p:sp>
+      <p:sp>
+        <p:nvSpPr>
+          <p:cNvPr id="52" name="Google Shape;77;p15">
+            <a:extLst>
+              <a:ext uri="{FF2B5EF4-FFF2-40B4-BE49-F238E27FC236}">
+                <a16:creationId xmlns:a16="http://schemas.microsoft.com/office/drawing/2014/main" id="{25254912-FAE9-4996-82B4-624A8A2437BE}"/>
+              </a:ext>
+            </a:extLst>
+          </p:cNvPr>
+          <p:cNvSpPr txBox="1"/>
+          <p:nvPr/>
+        </p:nvSpPr>
+        <p:spPr>
+          <a:xfrm>
+            <a:off x="1934779" y="4123950"/>
+            <a:ext cx="1139700" cy="225300"/>
+          </a:xfrm>
+          <a:prstGeom prst="rect">
+            <a:avLst/>
+          </a:prstGeom>
+          <a:noFill/>
+          <a:ln>
+            <a:noFill/>
+          </a:ln>
+        </p:spPr>
+        <p:txBody>
+          <a:bodyPr spcFirstLastPara="1" wrap="square" lIns="81625" tIns="40825" rIns="81625" bIns="40825" anchor="t" anchorCtr="0">
+            <a:noAutofit/>
+          </a:bodyPr>
+          <a:lstStyle/>
+          <a:p>
+            <a:pPr marL="0" marR="0" lvl="0" indent="0" algn="r" rtl="0">
+              <a:spcBef>
+                <a:spcPts val="0"/>
+              </a:spcBef>
+              <a:spcAft>
+                <a:spcPts val="0"/>
+              </a:spcAft>
+              <a:buNone/>
+            </a:pPr>
+            <a:r>
+              <a:rPr lang="en" sz="900" b="0" strike="noStrike" dirty="0">
+                <a:latin typeface="Verdana"/>
+                <a:ea typeface="Verdana"/>
+                <a:cs typeface="Verdana"/>
+                <a:sym typeface="Verdana"/>
+              </a:rPr>
+              <a:t>Solicitar Pedido</a:t>
+            </a:r>
+            <a:endParaRPr sz="900" b="0" strike="noStrike" dirty="0">
+              <a:latin typeface="Arial"/>
+              <a:ea typeface="Arial"/>
+              <a:cs typeface="Arial"/>
+              <a:sym typeface="Arial"/>
+            </a:endParaRPr>
+          </a:p>
+        </p:txBody>
+      </p:sp>
+      <p:sp>
+        <p:nvSpPr>
+          <p:cNvPr id="53" name="Google Shape;63;p15">
+            <a:extLst>
+              <a:ext uri="{FF2B5EF4-FFF2-40B4-BE49-F238E27FC236}">
+                <a16:creationId xmlns:a16="http://schemas.microsoft.com/office/drawing/2014/main" id="{A998C017-2A6A-4011-BB84-F0C198C493C3}"/>
+              </a:ext>
+            </a:extLst>
+          </p:cNvPr>
+          <p:cNvSpPr/>
+          <p:nvPr/>
+        </p:nvSpPr>
+        <p:spPr>
+          <a:xfrm>
+            <a:off x="659439" y="1577980"/>
+            <a:ext cx="1272000" cy="1110300"/>
+          </a:xfrm>
+          <a:prstGeom prst="rect">
+            <a:avLst/>
+          </a:prstGeom>
+          <a:solidFill>
+            <a:srgbClr val="FFFFFF"/>
+          </a:solidFill>
+          <a:ln w="29150" cap="flat" cmpd="sng">
+            <a:solidFill>
+              <a:srgbClr val="000000"/>
+            </a:solidFill>
+            <a:prstDash val="solid"/>
+            <a:round/>
+            <a:headEnd type="none" w="sm" len="sm"/>
+            <a:tailEnd type="none" w="sm" len="sm"/>
+          </a:ln>
+        </p:spPr>
+        <p:txBody>
+          <a:bodyPr spcFirstLastPara="1" wrap="square" lIns="94700" tIns="53875" rIns="94700" bIns="53875" anchor="ctr" anchorCtr="0">
+            <a:noAutofit/>
+          </a:bodyPr>
+          <a:lstStyle/>
+          <a:p>
+            <a:pPr marL="0" marR="0" lvl="0" indent="0" algn="ctr" rtl="0">
+              <a:spcBef>
+                <a:spcPts val="0"/>
+              </a:spcBef>
+              <a:spcAft>
+                <a:spcPts val="0"/>
+              </a:spcAft>
+              <a:buNone/>
+            </a:pPr>
+            <a:r>
+              <a:rPr lang="en" sz="1000" b="0" i="0" u="none" strike="noStrike" cap="none" dirty="0">
+                <a:solidFill>
+                  <a:srgbClr val="666666"/>
+                </a:solidFill>
+                <a:latin typeface="Verdana"/>
+                <a:ea typeface="Verdana"/>
+                <a:cs typeface="Verdana"/>
+                <a:sym typeface="Verdana"/>
+              </a:rPr>
+              <a:t>«component»</a:t>
+            </a:r>
+            <a:endParaRPr sz="1000" b="0" i="0" u="none" strike="noStrike" cap="none" dirty="0">
+              <a:latin typeface="Arial"/>
+              <a:ea typeface="Arial"/>
+              <a:cs typeface="Arial"/>
+              <a:sym typeface="Arial"/>
+            </a:endParaRPr>
+          </a:p>
+          <a:p>
+            <a:pPr marL="0" marR="0" lvl="0" indent="0" algn="ctr" rtl="0">
+              <a:spcBef>
+                <a:spcPts val="0"/>
+              </a:spcBef>
+              <a:spcAft>
+                <a:spcPts val="0"/>
+              </a:spcAft>
+              <a:buNone/>
+            </a:pPr>
+            <a:endParaRPr sz="1000" b="0" i="0" u="none" strike="noStrike" cap="none" dirty="0">
+              <a:latin typeface="Arial"/>
+              <a:ea typeface="Arial"/>
+              <a:cs typeface="Arial"/>
+              <a:sym typeface="Arial"/>
+            </a:endParaRPr>
+          </a:p>
+          <a:p>
+            <a:pPr marL="0" marR="0" lvl="0" indent="0" algn="ctr" rtl="0">
+              <a:spcBef>
+                <a:spcPts val="0"/>
+              </a:spcBef>
+              <a:spcAft>
+                <a:spcPts val="0"/>
+              </a:spcAft>
+              <a:buNone/>
+            </a:pPr>
+            <a:r>
+              <a:rPr lang="en" sz="1200" b="1" i="0" u="none" strike="noStrike" cap="none" dirty="0">
+                <a:latin typeface="Verdana"/>
+                <a:ea typeface="Verdana"/>
+                <a:cs typeface="Verdana"/>
+                <a:sym typeface="Verdana"/>
+              </a:rPr>
+              <a:t>Solicita Refeição</a:t>
+            </a:r>
+            <a:endParaRPr sz="1200" b="0" i="0" u="none" strike="noStrike" cap="none" dirty="0">
+              <a:latin typeface="Arial"/>
+              <a:ea typeface="Arial"/>
+              <a:cs typeface="Arial"/>
+              <a:sym typeface="Arial"/>
+            </a:endParaRPr>
+          </a:p>
+        </p:txBody>
+      </p:sp>
+      <p:grpSp>
+        <p:nvGrpSpPr>
+          <p:cNvPr id="54" name="Google Shape;166;p16">
+            <a:extLst>
+              <a:ext uri="{FF2B5EF4-FFF2-40B4-BE49-F238E27FC236}">
+                <a16:creationId xmlns:a16="http://schemas.microsoft.com/office/drawing/2014/main" id="{00819328-3B44-4E02-B3C7-E74220A2ED08}"/>
+              </a:ext>
+            </a:extLst>
+          </p:cNvPr>
+          <p:cNvGrpSpPr/>
+          <p:nvPr/>
+        </p:nvGrpSpPr>
+        <p:grpSpPr>
+          <a:xfrm>
+            <a:off x="2538872" y="3793437"/>
+            <a:ext cx="625260" cy="221700"/>
+            <a:chOff x="4470180" y="4459680"/>
+            <a:chExt cx="625260" cy="221700"/>
+          </a:xfrm>
+        </p:grpSpPr>
+        <p:sp>
+          <p:nvSpPr>
+            <p:cNvPr id="55" name="Google Shape;167;p16">
+              <a:extLst>
+                <a:ext uri="{FF2B5EF4-FFF2-40B4-BE49-F238E27FC236}">
+                  <a16:creationId xmlns:a16="http://schemas.microsoft.com/office/drawing/2014/main" id="{9F437043-901B-469E-B2C7-19AE9C4E0D80}"/>
+                </a:ext>
+              </a:extLst>
+            </p:cNvPr>
+            <p:cNvSpPr/>
+            <p:nvPr/>
+          </p:nvSpPr>
+          <p:spPr>
+            <a:xfrm flipH="1">
+              <a:off x="4470180" y="4459680"/>
+              <a:ext cx="221700" cy="221700"/>
+            </a:xfrm>
+            <a:prstGeom prst="ellipse">
+              <a:avLst/>
+            </a:prstGeom>
+            <a:solidFill>
+              <a:srgbClr val="FFFFFF"/>
+            </a:solidFill>
+            <a:ln w="29150" cap="flat" cmpd="sng">
+              <a:solidFill>
+                <a:srgbClr val="000000"/>
+              </a:solidFill>
+              <a:prstDash val="solid"/>
+              <a:round/>
+              <a:headEnd type="none" w="sm" len="sm"/>
+              <a:tailEnd type="none" w="sm" len="sm"/>
+            </a:ln>
+          </p:spPr>
+          <p:txBody>
+            <a:bodyPr spcFirstLastPara="1" wrap="square" lIns="91425" tIns="91425" rIns="91425" bIns="91425" anchor="ctr" anchorCtr="0">
+              <a:noAutofit/>
+            </a:bodyPr>
+            <a:lstStyle/>
+            <a:p>
+              <a:pPr marL="0" lvl="0" indent="0" algn="l" rtl="0">
+                <a:spcBef>
+                  <a:spcPts val="0"/>
+                </a:spcBef>
+                <a:spcAft>
+                  <a:spcPts val="0"/>
+                </a:spcAft>
+                <a:buNone/>
+              </a:pPr>
+              <a:endParaRPr/>
+            </a:p>
+          </p:txBody>
+        </p:sp>
+        <p:cxnSp>
+          <p:nvCxnSpPr>
+            <p:cNvPr id="56" name="Google Shape;168;p16">
+              <a:extLst>
+                <a:ext uri="{FF2B5EF4-FFF2-40B4-BE49-F238E27FC236}">
+                  <a16:creationId xmlns:a16="http://schemas.microsoft.com/office/drawing/2014/main" id="{09F1C295-88F2-4C1D-A719-A8222A46BF9D}"/>
+                </a:ext>
+              </a:extLst>
+            </p:cNvPr>
+            <p:cNvCxnSpPr/>
+            <p:nvPr/>
+          </p:nvCxnSpPr>
+          <p:spPr>
+            <a:xfrm rot="10800000">
+              <a:off x="4691940" y="4570200"/>
+              <a:ext cx="403500" cy="0"/>
+            </a:xfrm>
+            <a:prstGeom prst="straightConnector1">
+              <a:avLst/>
+            </a:prstGeom>
+            <a:noFill/>
+            <a:ln w="29150" cap="flat" cmpd="sng">
+              <a:solidFill>
+                <a:srgbClr val="000000"/>
+              </a:solidFill>
+              <a:prstDash val="solid"/>
+              <a:round/>
+              <a:headEnd type="none" w="sm" len="sm"/>
+              <a:tailEnd type="none" w="sm" len="sm"/>
+            </a:ln>
+          </p:spPr>
+        </p:cxnSp>
+      </p:grpSp>
+      <p:grpSp>
+        <p:nvGrpSpPr>
+          <p:cNvPr id="58" name="Google Shape;142;p15">
+            <a:extLst>
+              <a:ext uri="{FF2B5EF4-FFF2-40B4-BE49-F238E27FC236}">
+                <a16:creationId xmlns:a16="http://schemas.microsoft.com/office/drawing/2014/main" id="{17F444C2-4D5C-40A4-8E69-5CC1F946EA72}"/>
+              </a:ext>
+            </a:extLst>
+          </p:cNvPr>
+          <p:cNvGrpSpPr/>
+          <p:nvPr/>
+        </p:nvGrpSpPr>
+        <p:grpSpPr>
+          <a:xfrm rot="5400000">
+            <a:off x="1295439" y="2781039"/>
+            <a:ext cx="348109" cy="225324"/>
+            <a:chOff x="5957280" y="2713680"/>
+            <a:chExt cx="383760" cy="248400"/>
+          </a:xfrm>
+        </p:grpSpPr>
+        <p:sp>
+          <p:nvSpPr>
+            <p:cNvPr id="59" name="Google Shape;143;p15">
+              <a:extLst>
+                <a:ext uri="{FF2B5EF4-FFF2-40B4-BE49-F238E27FC236}">
+                  <a16:creationId xmlns:a16="http://schemas.microsoft.com/office/drawing/2014/main" id="{7F33B464-304E-4237-AE43-C8B60BA41E88}"/>
+                </a:ext>
+              </a:extLst>
+            </p:cNvPr>
+            <p:cNvSpPr/>
+            <p:nvPr/>
+          </p:nvSpPr>
+          <p:spPr>
+            <a:xfrm>
+              <a:off x="6213600" y="2713680"/>
+              <a:ext cx="127440" cy="248400"/>
+            </a:xfrm>
+            <a:custGeom>
+              <a:avLst/>
+              <a:gdLst/>
+              <a:ahLst/>
+              <a:cxnLst/>
+              <a:rect l="l" t="t" r="r" b="b"/>
+              <a:pathLst>
+                <a:path w="354" h="690" extrusionOk="0">
+                  <a:moveTo>
+                    <a:pt x="352" y="0"/>
+                  </a:moveTo>
+                  <a:cubicBezTo>
+                    <a:pt x="351" y="0"/>
+                    <a:pt x="351" y="0"/>
+                    <a:pt x="350" y="1"/>
+                  </a:cubicBezTo>
+                  <a:cubicBezTo>
+                    <a:pt x="350" y="1"/>
+                    <a:pt x="349" y="1"/>
+                    <a:pt x="349" y="2"/>
+                  </a:cubicBezTo>
+                  <a:cubicBezTo>
+                    <a:pt x="348" y="3"/>
+                    <a:pt x="348" y="3"/>
+                    <a:pt x="348" y="4"/>
+                  </a:cubicBezTo>
+                  <a:lnTo>
+                    <a:pt x="348" y="8"/>
+                  </a:lnTo>
+                  <a:cubicBezTo>
+                    <a:pt x="347" y="8"/>
+                    <a:pt x="346" y="8"/>
+                    <a:pt x="345" y="8"/>
+                  </a:cubicBezTo>
+                  <a:cubicBezTo>
+                    <a:pt x="298" y="8"/>
+                    <a:pt x="252" y="17"/>
+                    <a:pt x="211" y="33"/>
+                  </a:cubicBezTo>
+                  <a:cubicBezTo>
+                    <a:pt x="171" y="50"/>
+                    <a:pt x="135" y="75"/>
+                    <a:pt x="104" y="104"/>
+                  </a:cubicBezTo>
+                  <a:cubicBezTo>
+                    <a:pt x="75" y="135"/>
+                    <a:pt x="50" y="171"/>
+                    <a:pt x="33" y="211"/>
+                  </a:cubicBezTo>
+                  <a:cubicBezTo>
+                    <a:pt x="17" y="252"/>
+                    <a:pt x="8" y="298"/>
+                    <a:pt x="8" y="345"/>
+                  </a:cubicBezTo>
+                  <a:cubicBezTo>
+                    <a:pt x="8" y="392"/>
+                    <a:pt x="17" y="437"/>
+                    <a:pt x="33" y="478"/>
+                  </a:cubicBezTo>
+                  <a:cubicBezTo>
+                    <a:pt x="50" y="519"/>
+                    <a:pt x="75" y="555"/>
+                    <a:pt x="104" y="585"/>
+                  </a:cubicBezTo>
+                  <a:cubicBezTo>
+                    <a:pt x="135" y="615"/>
+                    <a:pt x="171" y="640"/>
+                    <a:pt x="211" y="656"/>
+                  </a:cubicBezTo>
+                  <a:cubicBezTo>
+                    <a:pt x="252" y="673"/>
+                    <a:pt x="298" y="683"/>
+                    <a:pt x="345" y="683"/>
+                  </a:cubicBezTo>
+                  <a:cubicBezTo>
+                    <a:pt x="346" y="683"/>
+                    <a:pt x="347" y="683"/>
+                    <a:pt x="348" y="683"/>
+                  </a:cubicBezTo>
+                  <a:lnTo>
+                    <a:pt x="348" y="689"/>
+                  </a:lnTo>
+                  <a:cubicBezTo>
+                    <a:pt x="347" y="689"/>
+                    <a:pt x="346" y="689"/>
+                    <a:pt x="345" y="689"/>
+                  </a:cubicBezTo>
+                  <a:cubicBezTo>
+                    <a:pt x="296" y="689"/>
+                    <a:pt x="250" y="680"/>
+                    <a:pt x="208" y="663"/>
+                  </a:cubicBezTo>
+                  <a:cubicBezTo>
+                    <a:pt x="167" y="646"/>
+                    <a:pt x="130" y="621"/>
+                    <a:pt x="99" y="590"/>
+                  </a:cubicBezTo>
+                  <a:cubicBezTo>
+                    <a:pt x="68" y="559"/>
+                    <a:pt x="43" y="522"/>
+                    <a:pt x="27" y="481"/>
+                  </a:cubicBezTo>
+                  <a:cubicBezTo>
+                    <a:pt x="10" y="439"/>
+                    <a:pt x="0" y="393"/>
+                    <a:pt x="0" y="345"/>
+                  </a:cubicBezTo>
+                  <a:cubicBezTo>
+                    <a:pt x="0" y="296"/>
+                    <a:pt x="10" y="250"/>
+                    <a:pt x="27" y="208"/>
+                  </a:cubicBezTo>
+                  <a:cubicBezTo>
+                    <a:pt x="43" y="167"/>
+                    <a:pt x="68" y="130"/>
+                    <a:pt x="99" y="99"/>
+                  </a:cubicBezTo>
+                  <a:cubicBezTo>
+                    <a:pt x="130" y="68"/>
+                    <a:pt x="167" y="43"/>
+                    <a:pt x="208" y="27"/>
+                  </a:cubicBezTo>
+                  <a:cubicBezTo>
+                    <a:pt x="250" y="10"/>
+                    <a:pt x="296" y="0"/>
+                    <a:pt x="345" y="0"/>
+                  </a:cubicBezTo>
+                  <a:cubicBezTo>
+                    <a:pt x="347" y="0"/>
+                    <a:pt x="350" y="0"/>
+                    <a:pt x="353" y="0"/>
+                  </a:cubicBezTo>
+                  <a:lnTo>
+                    <a:pt x="352" y="0"/>
+                  </a:lnTo>
+                </a:path>
+              </a:pathLst>
+            </a:custGeom>
+            <a:solidFill>
+              <a:srgbClr val="000000"/>
+            </a:solidFill>
+            <a:ln w="29150" cap="flat" cmpd="sng">
+              <a:solidFill>
+                <a:srgbClr val="000000"/>
+              </a:solidFill>
+              <a:prstDash val="solid"/>
+              <a:round/>
+              <a:headEnd type="none" w="sm" len="sm"/>
+              <a:tailEnd type="none" w="sm" len="sm"/>
+            </a:ln>
+          </p:spPr>
+          <p:txBody>
+            <a:bodyPr spcFirstLastPara="1" wrap="square" lIns="82925" tIns="82925" rIns="82925" bIns="82925" anchor="ctr" anchorCtr="0">
+              <a:noAutofit/>
+            </a:bodyPr>
+            <a:lstStyle/>
+            <a:p>
+              <a:pPr marL="0" lvl="0" indent="0" algn="l" rtl="0">
+                <a:spcBef>
+                  <a:spcPts val="0"/>
+                </a:spcBef>
+                <a:spcAft>
+                  <a:spcPts val="0"/>
+                </a:spcAft>
+                <a:buNone/>
+              </a:pPr>
+              <a:endParaRPr/>
+            </a:p>
+          </p:txBody>
+        </p:sp>
+        <p:cxnSp>
+          <p:nvCxnSpPr>
+            <p:cNvPr id="60" name="Google Shape;144;p15">
+              <a:extLst>
+                <a:ext uri="{FF2B5EF4-FFF2-40B4-BE49-F238E27FC236}">
+                  <a16:creationId xmlns:a16="http://schemas.microsoft.com/office/drawing/2014/main" id="{57D35700-1153-4D08-AF83-73C0394789BF}"/>
+                </a:ext>
+              </a:extLst>
+            </p:cNvPr>
+            <p:cNvCxnSpPr/>
+            <p:nvPr/>
+          </p:nvCxnSpPr>
+          <p:spPr>
+            <a:xfrm>
+              <a:off x="5957280" y="2837520"/>
+              <a:ext cx="252000" cy="0"/>
+            </a:xfrm>
+            <a:prstGeom prst="straightConnector1">
+              <a:avLst/>
+            </a:prstGeom>
+            <a:noFill/>
+            <a:ln w="29150" cap="flat" cmpd="sng">
+              <a:solidFill>
+                <a:srgbClr val="000000"/>
+              </a:solidFill>
+              <a:prstDash val="solid"/>
+              <a:round/>
+              <a:headEnd type="none" w="sm" len="sm"/>
+              <a:tailEnd type="none" w="sm" len="sm"/>
+            </a:ln>
+          </p:spPr>
+        </p:cxnSp>
+      </p:grpSp>
+      <p:cxnSp>
+        <p:nvCxnSpPr>
+          <p:cNvPr id="64" name="Google Shape;75;p15">
+            <a:extLst>
+              <a:ext uri="{FF2B5EF4-FFF2-40B4-BE49-F238E27FC236}">
+                <a16:creationId xmlns:a16="http://schemas.microsoft.com/office/drawing/2014/main" id="{CB910BFC-40F7-4D91-A0C8-92AAC3D3AF56}"/>
+              </a:ext>
+            </a:extLst>
+          </p:cNvPr>
+          <p:cNvCxnSpPr>
+            <a:cxnSpLocks/>
+            <a:endCxn id="55" idx="6"/>
+          </p:cNvCxnSpPr>
+          <p:nvPr/>
+        </p:nvCxnSpPr>
+        <p:spPr>
+          <a:xfrm>
+            <a:off x="1469493" y="3067756"/>
+            <a:ext cx="1069379" cy="836531"/>
+          </a:xfrm>
+          <a:prstGeom prst="bentConnector3">
+            <a:avLst>
+              <a:gd name="adj1" fmla="val 286"/>
+            </a:avLst>
+          </a:prstGeom>
+          <a:noFill/>
+          <a:ln w="29150" cap="flat" cmpd="sng">
+            <a:solidFill>
+              <a:srgbClr val="000000"/>
+            </a:solidFill>
+            <a:prstDash val="dash"/>
+            <a:round/>
+            <a:headEnd type="none" w="sm" len="sm"/>
+            <a:tailEnd type="triangle" w="med" len="med"/>
+          </a:ln>
+        </p:spPr>
+      </p:cxnSp>
+      <p:cxnSp>
+        <p:nvCxnSpPr>
+          <p:cNvPr id="72" name="Google Shape;75;p15">
+            <a:extLst>
+              <a:ext uri="{FF2B5EF4-FFF2-40B4-BE49-F238E27FC236}">
+                <a16:creationId xmlns:a16="http://schemas.microsoft.com/office/drawing/2014/main" id="{BD9CB55C-5AA1-4531-B617-54F97FF73DBC}"/>
+              </a:ext>
+            </a:extLst>
+          </p:cNvPr>
+          <p:cNvCxnSpPr>
+            <a:cxnSpLocks/>
+            <a:endCxn id="78" idx="2"/>
+          </p:cNvCxnSpPr>
+          <p:nvPr/>
+        </p:nvCxnSpPr>
+        <p:spPr>
+          <a:xfrm rot="5400000" flipH="1" flipV="1">
+            <a:off x="3406852" y="2583494"/>
+            <a:ext cx="654520" cy="314002"/>
+          </a:xfrm>
+          <a:prstGeom prst="bentConnector2">
+            <a:avLst/>
+          </a:prstGeom>
+          <a:noFill/>
+          <a:ln w="29150" cap="flat" cmpd="sng">
+            <a:solidFill>
+              <a:srgbClr val="000000"/>
+            </a:solidFill>
+            <a:prstDash val="dash"/>
+            <a:round/>
+            <a:headEnd type="none" w="sm" len="sm"/>
+            <a:tailEnd type="triangle" w="med" len="med"/>
+          </a:ln>
+        </p:spPr>
+      </p:cxnSp>
+      <p:sp>
+        <p:nvSpPr>
+          <p:cNvPr id="73" name="Google Shape;64;p15">
+            <a:extLst>
+              <a:ext uri="{FF2B5EF4-FFF2-40B4-BE49-F238E27FC236}">
+                <a16:creationId xmlns:a16="http://schemas.microsoft.com/office/drawing/2014/main" id="{BE113C19-2496-4499-85A7-DD95DF9EB520}"/>
+              </a:ext>
+            </a:extLst>
+          </p:cNvPr>
+          <p:cNvSpPr/>
+          <p:nvPr/>
+        </p:nvSpPr>
+        <p:spPr>
+          <a:xfrm>
+            <a:off x="4344215" y="2133130"/>
+            <a:ext cx="1182390" cy="781181"/>
+          </a:xfrm>
+          <a:prstGeom prst="rect">
+            <a:avLst/>
+          </a:prstGeom>
+          <a:solidFill>
+            <a:srgbClr val="FFFFFF"/>
+          </a:solidFill>
+          <a:ln w="29150" cap="flat" cmpd="sng">
+            <a:solidFill>
+              <a:srgbClr val="000000"/>
+            </a:solidFill>
+            <a:prstDash val="solid"/>
+            <a:round/>
+            <a:headEnd type="none" w="sm" len="sm"/>
+            <a:tailEnd type="none" w="sm" len="sm"/>
+          </a:ln>
+        </p:spPr>
+        <p:txBody>
+          <a:bodyPr spcFirstLastPara="1" wrap="square" lIns="94700" tIns="53875" rIns="94700" bIns="53875" anchor="ctr" anchorCtr="0">
+            <a:noAutofit/>
+          </a:bodyPr>
+          <a:lstStyle/>
+          <a:p>
+            <a:pPr marL="0" marR="0" lvl="0" indent="0" algn="ctr" rtl="0">
+              <a:spcBef>
+                <a:spcPts val="0"/>
+              </a:spcBef>
+              <a:spcAft>
+                <a:spcPts val="0"/>
+              </a:spcAft>
+              <a:buNone/>
+            </a:pPr>
+            <a:r>
+              <a:rPr lang="en" sz="1000" b="0" i="0" u="none" strike="noStrike" cap="none" dirty="0">
+                <a:solidFill>
+                  <a:srgbClr val="666666"/>
+                </a:solidFill>
+                <a:latin typeface="Verdana"/>
+                <a:ea typeface="Verdana"/>
+                <a:cs typeface="Verdana"/>
+                <a:sym typeface="Verdana"/>
+              </a:rPr>
+              <a:t>«component»</a:t>
+            </a:r>
+            <a:endParaRPr sz="1000" b="0" i="0" u="none" strike="noStrike" cap="none" dirty="0">
+              <a:latin typeface="Arial"/>
+              <a:ea typeface="Arial"/>
+              <a:cs typeface="Arial"/>
+              <a:sym typeface="Arial"/>
+            </a:endParaRPr>
+          </a:p>
+          <a:p>
+            <a:pPr marL="0" marR="0" lvl="0" indent="0" algn="ctr" rtl="0">
+              <a:spcBef>
+                <a:spcPts val="0"/>
+              </a:spcBef>
+              <a:spcAft>
+                <a:spcPts val="0"/>
+              </a:spcAft>
+              <a:buNone/>
+            </a:pPr>
+            <a:endParaRPr lang="pt-BR" sz="1000" b="0" i="0" u="none" strike="noStrike" cap="none" dirty="0">
+              <a:latin typeface="Arial"/>
+              <a:ea typeface="Arial"/>
+              <a:cs typeface="Arial"/>
+              <a:sym typeface="Arial"/>
+            </a:endParaRPr>
+          </a:p>
+          <a:p>
+            <a:pPr marL="0" marR="0" lvl="0" indent="0" algn="ctr" rtl="0">
+              <a:spcBef>
+                <a:spcPts val="0"/>
+              </a:spcBef>
+              <a:spcAft>
+                <a:spcPts val="0"/>
+              </a:spcAft>
+              <a:buNone/>
+            </a:pPr>
+            <a:r>
+              <a:rPr lang="pt-BR" sz="1200" b="1" dirty="0">
+                <a:latin typeface="Verdana"/>
+                <a:ea typeface="Verdana"/>
+                <a:cs typeface="Verdana"/>
+                <a:sym typeface="Verdana"/>
+              </a:rPr>
+              <a:t>Cobrança</a:t>
+            </a:r>
+            <a:endParaRPr lang="pt-BR" sz="1200" b="0" i="0" u="none" strike="noStrike" cap="none" dirty="0">
+              <a:latin typeface="Arial"/>
+              <a:ea typeface="Arial"/>
+              <a:cs typeface="Arial"/>
+              <a:sym typeface="Arial"/>
+            </a:endParaRPr>
+          </a:p>
+        </p:txBody>
+      </p:sp>
+      <p:grpSp>
+        <p:nvGrpSpPr>
+          <p:cNvPr id="74" name="Google Shape;142;p15">
+            <a:extLst>
+              <a:ext uri="{FF2B5EF4-FFF2-40B4-BE49-F238E27FC236}">
+                <a16:creationId xmlns:a16="http://schemas.microsoft.com/office/drawing/2014/main" id="{C793C9C8-0871-4E00-82DE-C88E2C6E55D2}"/>
+              </a:ext>
+            </a:extLst>
+          </p:cNvPr>
+          <p:cNvGrpSpPr/>
+          <p:nvPr/>
+        </p:nvGrpSpPr>
+        <p:grpSpPr>
+          <a:xfrm rot="16200000">
+            <a:off x="3420507" y="3071347"/>
+            <a:ext cx="348109" cy="225324"/>
+            <a:chOff x="5957280" y="2713680"/>
+            <a:chExt cx="383760" cy="248400"/>
+          </a:xfrm>
+        </p:grpSpPr>
+        <p:sp>
+          <p:nvSpPr>
+            <p:cNvPr id="75" name="Google Shape;143;p15">
+              <a:extLst>
+                <a:ext uri="{FF2B5EF4-FFF2-40B4-BE49-F238E27FC236}">
+                  <a16:creationId xmlns:a16="http://schemas.microsoft.com/office/drawing/2014/main" id="{8B79DB29-C2E9-4907-9330-50A2F9943ABC}"/>
+                </a:ext>
+              </a:extLst>
+            </p:cNvPr>
+            <p:cNvSpPr/>
+            <p:nvPr/>
+          </p:nvSpPr>
+          <p:spPr>
+            <a:xfrm>
+              <a:off x="6213600" y="2713680"/>
+              <a:ext cx="127440" cy="248400"/>
+            </a:xfrm>
+            <a:custGeom>
+              <a:avLst/>
+              <a:gdLst/>
+              <a:ahLst/>
+              <a:cxnLst/>
+              <a:rect l="l" t="t" r="r" b="b"/>
+              <a:pathLst>
+                <a:path w="354" h="690" extrusionOk="0">
+                  <a:moveTo>
+                    <a:pt x="352" y="0"/>
+                  </a:moveTo>
+                  <a:cubicBezTo>
+                    <a:pt x="351" y="0"/>
+                    <a:pt x="351" y="0"/>
+                    <a:pt x="350" y="1"/>
+                  </a:cubicBezTo>
+                  <a:cubicBezTo>
+                    <a:pt x="350" y="1"/>
+                    <a:pt x="349" y="1"/>
+                    <a:pt x="349" y="2"/>
+                  </a:cubicBezTo>
+                  <a:cubicBezTo>
+                    <a:pt x="348" y="3"/>
+                    <a:pt x="348" y="3"/>
+                    <a:pt x="348" y="4"/>
+                  </a:cubicBezTo>
+                  <a:lnTo>
+                    <a:pt x="348" y="8"/>
+                  </a:lnTo>
+                  <a:cubicBezTo>
+                    <a:pt x="347" y="8"/>
+                    <a:pt x="346" y="8"/>
+                    <a:pt x="345" y="8"/>
+                  </a:cubicBezTo>
+                  <a:cubicBezTo>
+                    <a:pt x="298" y="8"/>
+                    <a:pt x="252" y="17"/>
+                    <a:pt x="211" y="33"/>
+                  </a:cubicBezTo>
+                  <a:cubicBezTo>
+                    <a:pt x="171" y="50"/>
+                    <a:pt x="135" y="75"/>
+                    <a:pt x="104" y="104"/>
+                  </a:cubicBezTo>
+                  <a:cubicBezTo>
+                    <a:pt x="75" y="135"/>
+                    <a:pt x="50" y="171"/>
+                    <a:pt x="33" y="211"/>
+                  </a:cubicBezTo>
+                  <a:cubicBezTo>
+                    <a:pt x="17" y="252"/>
+                    <a:pt x="8" y="298"/>
+                    <a:pt x="8" y="345"/>
+                  </a:cubicBezTo>
+                  <a:cubicBezTo>
+                    <a:pt x="8" y="392"/>
+                    <a:pt x="17" y="437"/>
+                    <a:pt x="33" y="478"/>
+                  </a:cubicBezTo>
+                  <a:cubicBezTo>
+                    <a:pt x="50" y="519"/>
+                    <a:pt x="75" y="555"/>
+                    <a:pt x="104" y="585"/>
+                  </a:cubicBezTo>
+                  <a:cubicBezTo>
+                    <a:pt x="135" y="615"/>
+                    <a:pt x="171" y="640"/>
+                    <a:pt x="211" y="656"/>
+                  </a:cubicBezTo>
+                  <a:cubicBezTo>
+                    <a:pt x="252" y="673"/>
+                    <a:pt x="298" y="683"/>
+                    <a:pt x="345" y="683"/>
+                  </a:cubicBezTo>
+                  <a:cubicBezTo>
+                    <a:pt x="346" y="683"/>
+                    <a:pt x="347" y="683"/>
+                    <a:pt x="348" y="683"/>
+                  </a:cubicBezTo>
+                  <a:lnTo>
+                    <a:pt x="348" y="689"/>
+                  </a:lnTo>
+                  <a:cubicBezTo>
+                    <a:pt x="347" y="689"/>
+                    <a:pt x="346" y="689"/>
+                    <a:pt x="345" y="689"/>
+                  </a:cubicBezTo>
+                  <a:cubicBezTo>
+                    <a:pt x="296" y="689"/>
+                    <a:pt x="250" y="680"/>
+                    <a:pt x="208" y="663"/>
+                  </a:cubicBezTo>
+                  <a:cubicBezTo>
+                    <a:pt x="167" y="646"/>
+                    <a:pt x="130" y="621"/>
+                    <a:pt x="99" y="590"/>
+                  </a:cubicBezTo>
+                  <a:cubicBezTo>
+                    <a:pt x="68" y="559"/>
+                    <a:pt x="43" y="522"/>
+                    <a:pt x="27" y="481"/>
+                  </a:cubicBezTo>
+                  <a:cubicBezTo>
+                    <a:pt x="10" y="439"/>
+                    <a:pt x="0" y="393"/>
+                    <a:pt x="0" y="345"/>
+                  </a:cubicBezTo>
+                  <a:cubicBezTo>
+                    <a:pt x="0" y="296"/>
+                    <a:pt x="10" y="250"/>
+                    <a:pt x="27" y="208"/>
+                  </a:cubicBezTo>
+                  <a:cubicBezTo>
+                    <a:pt x="43" y="167"/>
+                    <a:pt x="68" y="130"/>
+                    <a:pt x="99" y="99"/>
+                  </a:cubicBezTo>
+                  <a:cubicBezTo>
+                    <a:pt x="130" y="68"/>
+                    <a:pt x="167" y="43"/>
+                    <a:pt x="208" y="27"/>
+                  </a:cubicBezTo>
+                  <a:cubicBezTo>
+                    <a:pt x="250" y="10"/>
+                    <a:pt x="296" y="0"/>
+                    <a:pt x="345" y="0"/>
+                  </a:cubicBezTo>
+                  <a:cubicBezTo>
+                    <a:pt x="347" y="0"/>
+                    <a:pt x="350" y="0"/>
+                    <a:pt x="353" y="0"/>
+                  </a:cubicBezTo>
+                  <a:lnTo>
+                    <a:pt x="352" y="0"/>
+                  </a:lnTo>
+                </a:path>
+              </a:pathLst>
+            </a:custGeom>
+            <a:solidFill>
+              <a:srgbClr val="000000"/>
+            </a:solidFill>
+            <a:ln w="29150" cap="flat" cmpd="sng">
+              <a:solidFill>
+                <a:srgbClr val="000000"/>
+              </a:solidFill>
+              <a:prstDash val="solid"/>
+              <a:round/>
+              <a:headEnd type="none" w="sm" len="sm"/>
+              <a:tailEnd type="none" w="sm" len="sm"/>
+            </a:ln>
+          </p:spPr>
+          <p:txBody>
+            <a:bodyPr spcFirstLastPara="1" wrap="square" lIns="82925" tIns="82925" rIns="82925" bIns="82925" anchor="ctr" anchorCtr="0">
+              <a:noAutofit/>
+            </a:bodyPr>
+            <a:lstStyle/>
+            <a:p>
+              <a:pPr marL="0" lvl="0" indent="0" algn="l" rtl="0">
+                <a:spcBef>
+                  <a:spcPts val="0"/>
+                </a:spcBef>
+                <a:spcAft>
+                  <a:spcPts val="0"/>
+                </a:spcAft>
+                <a:buNone/>
+              </a:pPr>
+              <a:endParaRPr/>
+            </a:p>
+          </p:txBody>
+        </p:sp>
+        <p:cxnSp>
+          <p:nvCxnSpPr>
+            <p:cNvPr id="76" name="Google Shape;144;p15">
+              <a:extLst>
+                <a:ext uri="{FF2B5EF4-FFF2-40B4-BE49-F238E27FC236}">
+                  <a16:creationId xmlns:a16="http://schemas.microsoft.com/office/drawing/2014/main" id="{2DC37B1A-F05A-427D-8424-6702AC01A879}"/>
+                </a:ext>
+              </a:extLst>
+            </p:cNvPr>
+            <p:cNvCxnSpPr/>
+            <p:nvPr/>
+          </p:nvCxnSpPr>
+          <p:spPr>
+            <a:xfrm>
+              <a:off x="5957280" y="2837520"/>
+              <a:ext cx="252000" cy="0"/>
+            </a:xfrm>
+            <a:prstGeom prst="straightConnector1">
+              <a:avLst/>
+            </a:prstGeom>
+            <a:noFill/>
+            <a:ln w="29150" cap="flat" cmpd="sng">
+              <a:solidFill>
+                <a:srgbClr val="000000"/>
+              </a:solidFill>
+              <a:prstDash val="solid"/>
+              <a:round/>
+              <a:headEnd type="none" w="sm" len="sm"/>
+              <a:tailEnd type="none" w="sm" len="sm"/>
+            </a:ln>
+          </p:spPr>
+        </p:cxnSp>
+      </p:grpSp>
+      <p:grpSp>
+        <p:nvGrpSpPr>
+          <p:cNvPr id="77" name="Google Shape;114;p15">
+            <a:extLst>
+              <a:ext uri="{FF2B5EF4-FFF2-40B4-BE49-F238E27FC236}">
+                <a16:creationId xmlns:a16="http://schemas.microsoft.com/office/drawing/2014/main" id="{665A8040-D947-414C-ACB1-8D14822DA6CF}"/>
+              </a:ext>
+            </a:extLst>
+          </p:cNvPr>
+          <p:cNvGrpSpPr/>
+          <p:nvPr/>
+        </p:nvGrpSpPr>
+        <p:grpSpPr>
+          <a:xfrm>
+            <a:off x="3891113" y="2302750"/>
+            <a:ext cx="449015" cy="220970"/>
+            <a:chOff x="261000" y="2714760"/>
+            <a:chExt cx="495000" cy="243600"/>
+          </a:xfrm>
+        </p:grpSpPr>
+        <p:sp>
+          <p:nvSpPr>
+            <p:cNvPr id="78" name="Google Shape;115;p15">
+              <a:extLst>
+                <a:ext uri="{FF2B5EF4-FFF2-40B4-BE49-F238E27FC236}">
+                  <a16:creationId xmlns:a16="http://schemas.microsoft.com/office/drawing/2014/main" id="{12066744-AAFC-4583-A26D-B005FB0F55B2}"/>
+                </a:ext>
+              </a:extLst>
+            </p:cNvPr>
+            <p:cNvSpPr/>
+            <p:nvPr/>
+          </p:nvSpPr>
+          <p:spPr>
+            <a:xfrm>
+              <a:off x="261000" y="2714760"/>
+              <a:ext cx="243000" cy="243600"/>
+            </a:xfrm>
+            <a:prstGeom prst="ellipse">
+              <a:avLst/>
+            </a:prstGeom>
+            <a:solidFill>
+              <a:srgbClr val="FFFFFF"/>
+            </a:solidFill>
+            <a:ln w="29150" cap="flat" cmpd="sng">
+              <a:solidFill>
+                <a:srgbClr val="000000"/>
+              </a:solidFill>
+              <a:prstDash val="solid"/>
+              <a:round/>
+              <a:headEnd type="none" w="sm" len="sm"/>
+              <a:tailEnd type="none" w="sm" len="sm"/>
+            </a:ln>
+          </p:spPr>
+          <p:txBody>
+            <a:bodyPr spcFirstLastPara="1" wrap="square" lIns="82925" tIns="82925" rIns="82925" bIns="82925" anchor="ctr" anchorCtr="0">
+              <a:noAutofit/>
+            </a:bodyPr>
+            <a:lstStyle/>
+            <a:p>
+              <a:pPr marL="0" lvl="0" indent="0" algn="l" rtl="0">
+                <a:spcBef>
+                  <a:spcPts val="0"/>
+                </a:spcBef>
+                <a:spcAft>
+                  <a:spcPts val="0"/>
+                </a:spcAft>
+                <a:buNone/>
+              </a:pPr>
+              <a:endParaRPr/>
+            </a:p>
+          </p:txBody>
+        </p:sp>
+        <p:cxnSp>
+          <p:nvCxnSpPr>
+            <p:cNvPr id="79" name="Google Shape;116;p15">
+              <a:extLst>
+                <a:ext uri="{FF2B5EF4-FFF2-40B4-BE49-F238E27FC236}">
+                  <a16:creationId xmlns:a16="http://schemas.microsoft.com/office/drawing/2014/main" id="{29F48844-0F37-46D7-8819-FF5C9EB54242}"/>
+                </a:ext>
+              </a:extLst>
+            </p:cNvPr>
+            <p:cNvCxnSpPr/>
+            <p:nvPr/>
+          </p:nvCxnSpPr>
+          <p:spPr>
+            <a:xfrm>
+              <a:off x="504000" y="2836440"/>
+              <a:ext cx="252000" cy="0"/>
+            </a:xfrm>
+            <a:prstGeom prst="straightConnector1">
+              <a:avLst/>
+            </a:prstGeom>
+            <a:noFill/>
+            <a:ln w="29150" cap="flat" cmpd="sng">
+              <a:solidFill>
+                <a:srgbClr val="000000"/>
+              </a:solidFill>
+              <a:prstDash val="solid"/>
+              <a:round/>
+              <a:headEnd type="none" w="sm" len="sm"/>
+              <a:tailEnd type="none" w="sm" len="sm"/>
+            </a:ln>
+          </p:spPr>
+        </p:cxnSp>
+      </p:grpSp>
+      <p:sp>
+        <p:nvSpPr>
+          <p:cNvPr id="85" name="Google Shape;77;p15">
+            <a:extLst>
+              <a:ext uri="{FF2B5EF4-FFF2-40B4-BE49-F238E27FC236}">
+                <a16:creationId xmlns:a16="http://schemas.microsoft.com/office/drawing/2014/main" id="{000BC6D2-58D9-4790-9558-0D85ED6F6942}"/>
+              </a:ext>
+            </a:extLst>
+          </p:cNvPr>
+          <p:cNvSpPr txBox="1"/>
+          <p:nvPr/>
+        </p:nvSpPr>
+        <p:spPr>
+          <a:xfrm>
+            <a:off x="3104934" y="2068354"/>
+            <a:ext cx="1139700" cy="225300"/>
+          </a:xfrm>
+          <a:prstGeom prst="rect">
+            <a:avLst/>
+          </a:prstGeom>
+          <a:noFill/>
+          <a:ln>
+            <a:noFill/>
+          </a:ln>
+        </p:spPr>
+        <p:txBody>
+          <a:bodyPr spcFirstLastPara="1" wrap="square" lIns="81625" tIns="40825" rIns="81625" bIns="40825" anchor="t" anchorCtr="0">
+            <a:noAutofit/>
+          </a:bodyPr>
+          <a:lstStyle/>
+          <a:p>
+            <a:pPr marL="0" marR="0" lvl="0" indent="0" algn="r" rtl="0">
+              <a:spcBef>
+                <a:spcPts val="0"/>
+              </a:spcBef>
+              <a:spcAft>
+                <a:spcPts val="0"/>
+              </a:spcAft>
+              <a:buNone/>
+            </a:pPr>
+            <a:r>
+              <a:rPr lang="en" sz="900" b="0" strike="noStrike" dirty="0">
+                <a:latin typeface="Verdana"/>
+                <a:ea typeface="Verdana"/>
+                <a:cs typeface="Verdana"/>
+                <a:sym typeface="Verdana"/>
+              </a:rPr>
+              <a:t>Efetivar Pedido</a:t>
+            </a:r>
+            <a:endParaRPr sz="900" b="0" strike="noStrike" dirty="0">
+              <a:latin typeface="Arial"/>
+              <a:ea typeface="Arial"/>
+              <a:cs typeface="Arial"/>
+              <a:sym typeface="Arial"/>
+            </a:endParaRPr>
+          </a:p>
+        </p:txBody>
+      </p:sp>
+    </p:spTree>
+    <p:extLst>
+      <p:ext uri="{BB962C8B-B14F-4D97-AF65-F5344CB8AC3E}">
+        <p14:creationId xmlns:p14="http://schemas.microsoft.com/office/powerpoint/2010/main" val="1690551873"/>
+      </p:ext>
+    </p:extLst>
+  </p:cSld>
+  <p:clrMapOvr>
+    <a:masterClrMapping/>
+  </p:clrMapOvr>
+</p:sld>
+</file>
+
+<file path=ppt/slides/slide4.xml><?xml version="1.0" encoding="utf-8"?>
 <p:sld xmlns:a="http://schemas.openxmlformats.org/drawingml/2006/main" xmlns:r="http://schemas.openxmlformats.org/officeDocument/2006/relationships" xmlns:p="http://schemas.openxmlformats.org/presentationml/2006/main">
   <p:cSld>
     <p:spTree>
@@ -11334,7 +13753,7 @@
 </p:sld>
 </file>
 
-<file path=ppt/slides/slide4.xml><?xml version="1.0" encoding="utf-8"?>
+<file path=ppt/slides/slide5.xml><?xml version="1.0" encoding="utf-8"?>
 <p:sld xmlns:a="http://schemas.openxmlformats.org/drawingml/2006/main" xmlns:r="http://schemas.openxmlformats.org/officeDocument/2006/relationships" xmlns:p="http://schemas.openxmlformats.org/presentationml/2006/main">
   <p:cSld>
     <p:spTree>
@@ -11394,14 +13813,14 @@
               <a:buNone/>
             </a:pPr>
             <a:r>
-              <a:rPr lang="en" sz="1600" i="0" u="none" strike="noStrike" cap="none">
+              <a:rPr lang="en" sz="1600" i="0" u="none" strike="noStrike" cap="none" dirty="0">
                 <a:solidFill>
                   <a:srgbClr val="666666"/>
                 </a:solidFill>
               </a:rPr>
-              <a:t>«component»</a:t>
+              <a:t>«cmponent»</a:t>
             </a:r>
-            <a:endParaRPr sz="1600" i="0" u="none" strike="noStrike" cap="none"/>
+            <a:endParaRPr sz="1600" i="0" u="none" strike="noStrike" cap="none" dirty="0"/>
           </a:p>
           <a:p>
             <a:pPr marL="0" marR="0" lvl="0" indent="0" algn="ctr" rtl="0">
@@ -11413,7 +13832,7 @@
               </a:spcAft>
               <a:buNone/>
             </a:pPr>
-            <a:endParaRPr sz="600" i="0" u="none" strike="noStrike" cap="none"/>
+            <a:endParaRPr sz="600" i="0" u="none" strike="noStrike" cap="none" dirty="0"/>
           </a:p>
           <a:p>
             <a:pPr marL="0" marR="0" lvl="0" indent="0" algn="ctr" rtl="0">
@@ -11426,10 +13845,10 @@
               <a:buNone/>
             </a:pPr>
             <a:r>
-              <a:rPr lang="en" sz="1800" b="1"/>
-              <a:t>Componente A</a:t>
+              <a:rPr lang="en" sz="1800" b="1" dirty="0"/>
+              <a:t>Comonente A</a:t>
             </a:r>
-            <a:endParaRPr sz="1800" i="0" u="none" strike="noStrike" cap="none"/>
+            <a:endParaRPr sz="1800" i="0" u="none" strike="noStrike" cap="none" dirty="0"/>
           </a:p>
         </p:txBody>
       </p:sp>
@@ -12927,6 +15346,217 @@
           </a:ln>
         </p:spPr>
       </p:pic>
+      <p:sp>
+        <p:nvSpPr>
+          <p:cNvPr id="32" name="Google Shape;203;p17">
+            <a:extLst>
+              <a:ext uri="{FF2B5EF4-FFF2-40B4-BE49-F238E27FC236}">
+                <a16:creationId xmlns:a16="http://schemas.microsoft.com/office/drawing/2014/main" id="{B523BF31-FE10-4F34-AC06-B9E6B89B8BDF}"/>
+              </a:ext>
+            </a:extLst>
+          </p:cNvPr>
+          <p:cNvSpPr/>
+          <p:nvPr/>
+        </p:nvSpPr>
+        <p:spPr>
+          <a:xfrm>
+            <a:off x="1047315" y="4223120"/>
+            <a:ext cx="807710" cy="45719"/>
+          </a:xfrm>
+          <a:custGeom>
+            <a:avLst/>
+            <a:gdLst/>
+            <a:ahLst/>
+            <a:cxnLst/>
+            <a:rect l="l" t="t" r="r" b="b"/>
+            <a:pathLst>
+              <a:path w="5086" h="1603" extrusionOk="0">
+                <a:moveTo>
+                  <a:pt x="0" y="1602"/>
+                </a:moveTo>
+                <a:lnTo>
+                  <a:pt x="2196" y="1602"/>
+                </a:lnTo>
+                <a:lnTo>
+                  <a:pt x="2196" y="0"/>
+                </a:lnTo>
+                <a:lnTo>
+                  <a:pt x="5060" y="0"/>
+                </a:lnTo>
+                <a:lnTo>
+                  <a:pt x="5085" y="0"/>
+                </a:lnTo>
+              </a:path>
+            </a:pathLst>
+          </a:custGeom>
+          <a:noFill/>
+          <a:ln w="29150" cap="flat" cmpd="sng">
+            <a:solidFill>
+              <a:srgbClr val="000000"/>
+            </a:solidFill>
+            <a:prstDash val="dash"/>
+            <a:round/>
+            <a:headEnd type="none" w="sm" len="sm"/>
+            <a:tailEnd type="none" w="sm" len="sm"/>
+          </a:ln>
+        </p:spPr>
+      </p:sp>
+      <p:sp>
+        <p:nvSpPr>
+          <p:cNvPr id="33" name="Google Shape;209;p17">
+            <a:extLst>
+              <a:ext uri="{FF2B5EF4-FFF2-40B4-BE49-F238E27FC236}">
+                <a16:creationId xmlns:a16="http://schemas.microsoft.com/office/drawing/2014/main" id="{86048A12-7385-4B0B-9E14-A1606C52382F}"/>
+              </a:ext>
+            </a:extLst>
+          </p:cNvPr>
+          <p:cNvSpPr/>
+          <p:nvPr/>
+        </p:nvSpPr>
+        <p:spPr>
+          <a:xfrm flipH="1">
+            <a:off x="2439222" y="2290247"/>
+            <a:ext cx="45719" cy="1692610"/>
+          </a:xfrm>
+          <a:custGeom>
+            <a:avLst/>
+            <a:gdLst/>
+            <a:ahLst/>
+            <a:cxnLst/>
+            <a:rect l="l" t="t" r="r" b="b"/>
+            <a:pathLst>
+              <a:path w="1579" h="2598" extrusionOk="0">
+                <a:moveTo>
+                  <a:pt x="1335" y="0"/>
+                </a:moveTo>
+                <a:lnTo>
+                  <a:pt x="0" y="0"/>
+                </a:lnTo>
+                <a:lnTo>
+                  <a:pt x="0" y="2597"/>
+                </a:lnTo>
+                <a:lnTo>
+                  <a:pt x="1578" y="2597"/>
+                </a:lnTo>
+              </a:path>
+            </a:pathLst>
+          </a:custGeom>
+          <a:noFill/>
+          <a:ln w="29150" cap="flat" cmpd="sng">
+            <a:solidFill>
+              <a:srgbClr val="000000"/>
+            </a:solidFill>
+            <a:prstDash val="dash"/>
+            <a:round/>
+            <a:headEnd type="none" w="sm" len="sm"/>
+            <a:tailEnd type="none" w="sm" len="sm"/>
+          </a:ln>
+        </p:spPr>
+      </p:sp>
+      <p:sp>
+        <p:nvSpPr>
+          <p:cNvPr id="34" name="Google Shape;209;p17">
+            <a:extLst>
+              <a:ext uri="{FF2B5EF4-FFF2-40B4-BE49-F238E27FC236}">
+                <a16:creationId xmlns:a16="http://schemas.microsoft.com/office/drawing/2014/main" id="{734A220C-CB85-40E5-BFE6-3BDAA55A5DFD}"/>
+              </a:ext>
+            </a:extLst>
+          </p:cNvPr>
+          <p:cNvSpPr/>
+          <p:nvPr/>
+        </p:nvSpPr>
+        <p:spPr>
+          <a:xfrm flipH="1">
+            <a:off x="2591622" y="2442647"/>
+            <a:ext cx="45719" cy="1692610"/>
+          </a:xfrm>
+          <a:custGeom>
+            <a:avLst/>
+            <a:gdLst/>
+            <a:ahLst/>
+            <a:cxnLst/>
+            <a:rect l="l" t="t" r="r" b="b"/>
+            <a:pathLst>
+              <a:path w="1579" h="2598" extrusionOk="0">
+                <a:moveTo>
+                  <a:pt x="1335" y="0"/>
+                </a:moveTo>
+                <a:lnTo>
+                  <a:pt x="0" y="0"/>
+                </a:lnTo>
+                <a:lnTo>
+                  <a:pt x="0" y="2597"/>
+                </a:lnTo>
+                <a:lnTo>
+                  <a:pt x="1578" y="2597"/>
+                </a:lnTo>
+              </a:path>
+            </a:pathLst>
+          </a:custGeom>
+          <a:noFill/>
+          <a:ln w="29150" cap="flat" cmpd="sng">
+            <a:solidFill>
+              <a:srgbClr val="000000"/>
+            </a:solidFill>
+            <a:prstDash val="dash"/>
+            <a:round/>
+            <a:headEnd type="none" w="sm" len="sm"/>
+            <a:tailEnd type="none" w="sm" len="sm"/>
+          </a:ln>
+        </p:spPr>
+      </p:sp>
+      <p:sp>
+        <p:nvSpPr>
+          <p:cNvPr id="35" name="Google Shape;209;p17">
+            <a:extLst>
+              <a:ext uri="{FF2B5EF4-FFF2-40B4-BE49-F238E27FC236}">
+                <a16:creationId xmlns:a16="http://schemas.microsoft.com/office/drawing/2014/main" id="{679DCB01-E981-4302-AAE8-66EBCB597853}"/>
+              </a:ext>
+            </a:extLst>
+          </p:cNvPr>
+          <p:cNvSpPr/>
+          <p:nvPr/>
+        </p:nvSpPr>
+        <p:spPr>
+          <a:xfrm>
+            <a:off x="7278518" y="2148485"/>
+            <a:ext cx="45719" cy="1376101"/>
+          </a:xfrm>
+          <a:custGeom>
+            <a:avLst/>
+            <a:gdLst/>
+            <a:ahLst/>
+            <a:cxnLst/>
+            <a:rect l="l" t="t" r="r" b="b"/>
+            <a:pathLst>
+              <a:path w="1579" h="2598" extrusionOk="0">
+                <a:moveTo>
+                  <a:pt x="1335" y="0"/>
+                </a:moveTo>
+                <a:lnTo>
+                  <a:pt x="0" y="0"/>
+                </a:lnTo>
+                <a:lnTo>
+                  <a:pt x="0" y="2597"/>
+                </a:lnTo>
+                <a:lnTo>
+                  <a:pt x="1578" y="2597"/>
+                </a:lnTo>
+              </a:path>
+            </a:pathLst>
+          </a:custGeom>
+          <a:noFill/>
+          <a:ln w="29150" cap="flat" cmpd="sng">
+            <a:solidFill>
+              <a:srgbClr val="000000"/>
+            </a:solidFill>
+            <a:prstDash val="dash"/>
+            <a:round/>
+            <a:headEnd type="none" w="sm" len="sm"/>
+            <a:tailEnd type="none" w="sm" len="sm"/>
+          </a:ln>
+        </p:spPr>
+      </p:sp>
     </p:spTree>
   </p:cSld>
   <p:clrMapOvr>

</xml_diff>